<commit_message>
Work on conclusion and presentation.
</commit_message>
<xml_diff>
--- a/UEA presentation.pptx
+++ b/UEA presentation.pptx
@@ -5,34 +5,35 @@
     <p:sldMasterId id="2147483660" r:id="rId1"/>
   </p:sldMasterIdLst>
   <p:notesMasterIdLst>
-    <p:notesMasterId r:id="rId27"/>
+    <p:notesMasterId r:id="rId28"/>
   </p:notesMasterIdLst>
   <p:sldIdLst>
     <p:sldId id="256" r:id="rId2"/>
     <p:sldId id="280" r:id="rId3"/>
     <p:sldId id="257" r:id="rId4"/>
-    <p:sldId id="258" r:id="rId5"/>
-    <p:sldId id="259" r:id="rId6"/>
-    <p:sldId id="260" r:id="rId7"/>
-    <p:sldId id="261" r:id="rId8"/>
-    <p:sldId id="262" r:id="rId9"/>
-    <p:sldId id="263" r:id="rId10"/>
-    <p:sldId id="264" r:id="rId11"/>
-    <p:sldId id="265" r:id="rId12"/>
-    <p:sldId id="266" r:id="rId13"/>
-    <p:sldId id="267" r:id="rId14"/>
-    <p:sldId id="269" r:id="rId15"/>
-    <p:sldId id="268" r:id="rId16"/>
-    <p:sldId id="271" r:id="rId17"/>
-    <p:sldId id="270" r:id="rId18"/>
-    <p:sldId id="272" r:id="rId19"/>
-    <p:sldId id="273" r:id="rId20"/>
-    <p:sldId id="274" r:id="rId21"/>
-    <p:sldId id="275" r:id="rId22"/>
-    <p:sldId id="276" r:id="rId23"/>
-    <p:sldId id="277" r:id="rId24"/>
-    <p:sldId id="278" r:id="rId25"/>
-    <p:sldId id="279" r:id="rId26"/>
+    <p:sldId id="281" r:id="rId5"/>
+    <p:sldId id="258" r:id="rId6"/>
+    <p:sldId id="259" r:id="rId7"/>
+    <p:sldId id="260" r:id="rId8"/>
+    <p:sldId id="261" r:id="rId9"/>
+    <p:sldId id="262" r:id="rId10"/>
+    <p:sldId id="263" r:id="rId11"/>
+    <p:sldId id="264" r:id="rId12"/>
+    <p:sldId id="265" r:id="rId13"/>
+    <p:sldId id="266" r:id="rId14"/>
+    <p:sldId id="267" r:id="rId15"/>
+    <p:sldId id="269" r:id="rId16"/>
+    <p:sldId id="268" r:id="rId17"/>
+    <p:sldId id="271" r:id="rId18"/>
+    <p:sldId id="270" r:id="rId19"/>
+    <p:sldId id="272" r:id="rId20"/>
+    <p:sldId id="273" r:id="rId21"/>
+    <p:sldId id="274" r:id="rId22"/>
+    <p:sldId id="275" r:id="rId23"/>
+    <p:sldId id="276" r:id="rId24"/>
+    <p:sldId id="277" r:id="rId25"/>
+    <p:sldId id="278" r:id="rId26"/>
+    <p:sldId id="279" r:id="rId27"/>
   </p:sldIdLst>
   <p:sldSz cx="12192000" cy="6858000"/>
   <p:notesSz cx="6858000" cy="9144000"/>
@@ -131,6 +132,11 @@
       </a:defRPr>
     </a:lvl9pPr>
   </p:defaultTextStyle>
+  <p:extLst>
+    <p:ext uri="{EFAFB233-063F-42B5-8137-9DF3F51BA10A}">
+      <p15:sldGuideLst xmlns:p15="http://schemas.microsoft.com/office/powerpoint/2012/main"/>
+    </p:ext>
+  </p:extLst>
 </p:presentation>
 </file>
 
@@ -215,7 +221,7 @@
           </a:lstStyle>
           <a:p>
             <a:fld id="{6F94820B-6DA2-F742-93FC-1D679188A49E}" type="datetimeFigureOut">
-              <a:t>2/11/21</a:t>
+              <a:t>2/12/21</a:t>
             </a:fld>
             <a:endParaRPr lang="en-US"/>
           </a:p>
@@ -695,7 +701,7 @@
           <a:lstStyle/>
           <a:p>
             <a:fld id="{342F7024-5685-4041-98CF-1DBE4146085C}" type="datetimeFigureOut">
-              <a:t>2/11/21</a:t>
+              <a:t>2/12/21</a:t>
             </a:fld>
             <a:endParaRPr lang="en-US"/>
           </a:p>
@@ -863,7 +869,7 @@
           <a:lstStyle/>
           <a:p>
             <a:fld id="{342F7024-5685-4041-98CF-1DBE4146085C}" type="datetimeFigureOut">
-              <a:t>2/11/21</a:t>
+              <a:t>2/12/21</a:t>
             </a:fld>
             <a:endParaRPr lang="en-US"/>
           </a:p>
@@ -1041,7 +1047,7 @@
           <a:lstStyle/>
           <a:p>
             <a:fld id="{342F7024-5685-4041-98CF-1DBE4146085C}" type="datetimeFigureOut">
-              <a:t>2/11/21</a:t>
+              <a:t>2/12/21</a:t>
             </a:fld>
             <a:endParaRPr lang="en-US"/>
           </a:p>
@@ -1214,7 +1220,7 @@
           <a:lstStyle/>
           <a:p>
             <a:fld id="{342F7024-5685-4041-98CF-1DBE4146085C}" type="datetimeFigureOut">
-              <a:t>2/11/21</a:t>
+              <a:t>2/12/21</a:t>
             </a:fld>
             <a:endParaRPr lang="en-US"/>
           </a:p>
@@ -1458,7 +1464,7 @@
           <a:lstStyle/>
           <a:p>
             <a:fld id="{342F7024-5685-4041-98CF-1DBE4146085C}" type="datetimeFigureOut">
-              <a:t>2/11/21</a:t>
+              <a:t>2/12/21</a:t>
             </a:fld>
             <a:endParaRPr lang="en-US"/>
           </a:p>
@@ -1688,7 +1694,7 @@
           <a:lstStyle/>
           <a:p>
             <a:fld id="{342F7024-5685-4041-98CF-1DBE4146085C}" type="datetimeFigureOut">
-              <a:t>2/11/21</a:t>
+              <a:t>2/12/21</a:t>
             </a:fld>
             <a:endParaRPr lang="en-US"/>
           </a:p>
@@ -2053,7 +2059,7 @@
           <a:lstStyle/>
           <a:p>
             <a:fld id="{342F7024-5685-4041-98CF-1DBE4146085C}" type="datetimeFigureOut">
-              <a:t>2/11/21</a:t>
+              <a:t>2/12/21</a:t>
             </a:fld>
             <a:endParaRPr lang="en-US"/>
           </a:p>
@@ -2169,7 +2175,7 @@
           <a:lstStyle/>
           <a:p>
             <a:fld id="{342F7024-5685-4041-98CF-1DBE4146085C}" type="datetimeFigureOut">
-              <a:t>2/11/21</a:t>
+              <a:t>2/12/21</a:t>
             </a:fld>
             <a:endParaRPr lang="en-US"/>
           </a:p>
@@ -2262,7 +2268,7 @@
           <a:lstStyle/>
           <a:p>
             <a:fld id="{342F7024-5685-4041-98CF-1DBE4146085C}" type="datetimeFigureOut">
-              <a:t>2/11/21</a:t>
+              <a:t>2/12/21</a:t>
             </a:fld>
             <a:endParaRPr lang="en-US"/>
           </a:p>
@@ -2537,7 +2543,7 @@
           <a:lstStyle/>
           <a:p>
             <a:fld id="{342F7024-5685-4041-98CF-1DBE4146085C}" type="datetimeFigureOut">
-              <a:t>2/11/21</a:t>
+              <a:t>2/12/21</a:t>
             </a:fld>
             <a:endParaRPr lang="en-US"/>
           </a:p>
@@ -2792,7 +2798,7 @@
           <a:lstStyle/>
           <a:p>
             <a:fld id="{342F7024-5685-4041-98CF-1DBE4146085C}" type="datetimeFigureOut">
-              <a:t>2/11/21</a:t>
+              <a:t>2/12/21</a:t>
             </a:fld>
             <a:endParaRPr lang="en-US"/>
           </a:p>
@@ -3006,7 +3012,7 @@
           </a:lstStyle>
           <a:p>
             <a:fld id="{342F7024-5685-4041-98CF-1DBE4146085C}" type="datetimeFigureOut">
-              <a:t>2/11/21</a:t>
+              <a:t>2/12/21</a:t>
             </a:fld>
             <a:endParaRPr lang="en-US"/>
           </a:p>
@@ -3571,23 +3577,27 @@
         </p:blipFill>
         <p:spPr bwMode="auto">
           <a:xfrm>
-            <a:off x="478865" y="3240982"/>
+            <a:off x="1999478" y="3229943"/>
             <a:ext cx="1049808" cy="1399743"/>
           </a:xfrm>
           <a:prstGeom prst="rect">
             <a:avLst/>
           </a:prstGeom>
-          <a:noFill/>
-          <a:extLst>
-            <a:ext uri="{909E8E84-426E-40DD-AFC4-6F175D3DCCD1}">
-              <a14:hiddenFill xmlns:a14="http://schemas.microsoft.com/office/drawing/2010/main">
-                <a:solidFill>
-                  <a:srgbClr val="FFFFFF"/>
-                </a:solidFill>
-              </a14:hiddenFill>
-            </a:ext>
-          </a:extLst>
         </p:spPr>
+        <p:style>
+          <a:lnRef idx="3">
+            <a:schemeClr val="lt1"/>
+          </a:lnRef>
+          <a:fillRef idx="1">
+            <a:schemeClr val="dk1"/>
+          </a:fillRef>
+          <a:effectRef idx="1">
+            <a:schemeClr val="dk1"/>
+          </a:effectRef>
+          <a:fontRef idx="minor">
+            <a:schemeClr val="lt1"/>
+          </a:fontRef>
+        </p:style>
       </p:pic>
       <p:pic>
         <p:nvPicPr>
@@ -3618,23 +3628,27 @@
         </p:blipFill>
         <p:spPr bwMode="auto">
           <a:xfrm>
-            <a:off x="1695363" y="3240982"/>
+            <a:off x="364937" y="3229944"/>
             <a:ext cx="1399743" cy="1399743"/>
           </a:xfrm>
           <a:prstGeom prst="rect">
             <a:avLst/>
           </a:prstGeom>
-          <a:noFill/>
-          <a:extLst>
-            <a:ext uri="{909E8E84-426E-40DD-AFC4-6F175D3DCCD1}">
-              <a14:hiddenFill xmlns:a14="http://schemas.microsoft.com/office/drawing/2010/main">
-                <a:solidFill>
-                  <a:srgbClr val="FFFFFF"/>
-                </a:solidFill>
-              </a14:hiddenFill>
-            </a:ext>
-          </a:extLst>
         </p:spPr>
+        <p:style>
+          <a:lnRef idx="3">
+            <a:schemeClr val="lt1"/>
+          </a:lnRef>
+          <a:fillRef idx="1">
+            <a:schemeClr val="dk1"/>
+          </a:fillRef>
+          <a:effectRef idx="1">
+            <a:schemeClr val="dk1"/>
+          </a:effectRef>
+          <a:fontRef idx="minor">
+            <a:schemeClr val="lt1"/>
+          </a:fontRef>
+        </p:style>
       </p:pic>
       <p:pic>
         <p:nvPicPr>
@@ -3665,23 +3679,27 @@
         </p:blipFill>
         <p:spPr bwMode="auto">
           <a:xfrm>
-            <a:off x="3232708" y="3240982"/>
+            <a:off x="3283855" y="3229942"/>
             <a:ext cx="1399743" cy="1399743"/>
           </a:xfrm>
           <a:prstGeom prst="rect">
             <a:avLst/>
           </a:prstGeom>
-          <a:noFill/>
-          <a:extLst>
-            <a:ext uri="{909E8E84-426E-40DD-AFC4-6F175D3DCCD1}">
-              <a14:hiddenFill xmlns:a14="http://schemas.microsoft.com/office/drawing/2010/main">
-                <a:solidFill>
-                  <a:srgbClr val="FFFFFF"/>
-                </a:solidFill>
-              </a14:hiddenFill>
-            </a:ext>
-          </a:extLst>
         </p:spPr>
+        <p:style>
+          <a:lnRef idx="3">
+            <a:schemeClr val="lt1"/>
+          </a:lnRef>
+          <a:fillRef idx="1">
+            <a:schemeClr val="dk1"/>
+          </a:fillRef>
+          <a:effectRef idx="1">
+            <a:schemeClr val="dk1"/>
+          </a:effectRef>
+          <a:fontRef idx="minor">
+            <a:schemeClr val="lt1"/>
+          </a:fontRef>
+        </p:style>
       </p:pic>
     </p:spTree>
     <p:extLst>
@@ -3718,7 +3736,7 @@
           <p:cNvPr id="2" name="Title 1">
             <a:extLst>
               <a:ext uri="{FF2B5EF4-FFF2-40B4-BE49-F238E27FC236}">
-                <a16:creationId xmlns:a16="http://schemas.microsoft.com/office/drawing/2014/main" id="{164C3870-2BFF-1943-B8F6-A0FB3D27548B}"/>
+                <a16:creationId xmlns:a16="http://schemas.microsoft.com/office/drawing/2014/main" id="{22CC0DA0-1E5A-B846-9F62-9D183C1BCC0A}"/>
               </a:ext>
             </a:extLst>
           </p:cNvPr>
@@ -3734,10 +3752,7 @@
           <a:bodyPr/>
           <a:lstStyle/>
           <a:p>
-            <a:r>
-              <a:rPr lang="en-US"/>
-              <a:t>Data</a:t>
-            </a:r>
+            <a:endParaRPr lang="en-US"/>
           </a:p>
         </p:txBody>
       </p:sp>
@@ -3746,7 +3761,7 @@
           <p:cNvPr id="3" name="Content Placeholder 2">
             <a:extLst>
               <a:ext uri="{FF2B5EF4-FFF2-40B4-BE49-F238E27FC236}">
-                <a16:creationId xmlns:a16="http://schemas.microsoft.com/office/drawing/2014/main" id="{E1B2D567-EF1B-DD4E-BC04-F1433C2DEBB3}"/>
+                <a16:creationId xmlns:a16="http://schemas.microsoft.com/office/drawing/2014/main" id="{AE904DC8-8796-0E41-A422-902A27A2E3E1}"/>
               </a:ext>
             </a:extLst>
           </p:cNvPr>
@@ -3759,73 +3774,47 @@
         </p:nvSpPr>
         <p:spPr/>
         <p:txBody>
-          <a:bodyPr>
-            <a:normAutofit fontScale="92500" lnSpcReduction="20000"/>
-          </a:bodyPr>
-          <a:lstStyle/>
-          <a:p>
-            <a:r>
-              <a:rPr lang="en-US"/>
-              <a:t>UK Biobank, a study of about 500,000 individuals born 1935-1970. Contains questionnaire data on health and social characteristics, also DNA data.</a:t>
-            </a:r>
-          </a:p>
-          <a:p>
-            <a:r>
-              <a:rPr lang="en-US"/>
-              <a:t>We don’t have explicit information on spouse pairs.</a:t>
-            </a:r>
-          </a:p>
-          <a:p>
-            <a:r>
-              <a:rPr lang="en-US"/>
-              <a:t>We categorize people as pairs if they:</a:t>
-            </a:r>
-          </a:p>
-          <a:p>
-            <a:r>
-              <a:rPr lang="en-GB"/>
-              <a:t>• had the same home postcode </a:t>
-            </a:r>
-          </a:p>
-          <a:p>
-            <a:r>
-              <a:rPr lang="en-GB"/>
-              <a:t>• have the same homeownership/renting status, length of time at the address, and number of children</a:t>
-            </a:r>
-          </a:p>
-          <a:p>
-            <a:r>
-              <a:rPr lang="en-GB"/>
-              <a:t>• attended the same UK Biobank assessment centre on the same day;</a:t>
-            </a:r>
-          </a:p>
-          <a:p>
-            <a:r>
-              <a:rPr lang="en-GB"/>
-              <a:t>• both reported living with their spouse (“husband, wife or partner”);</a:t>
-            </a:r>
-          </a:p>
-          <a:p>
-            <a:r>
-              <a:rPr lang="en-GB"/>
-              <a:t>• consisted of one male and one female.</a:t>
-            </a:r>
-          </a:p>
-          <a:p>
-            <a:r>
-              <a:rPr lang="en-GB"/>
-              <a:t> </a:t>
-            </a:r>
-          </a:p>
-          <a:p>
-            <a:endParaRPr lang="en-US"/>
-          </a:p>
-        </p:txBody>
-      </p:sp>
+          <a:bodyPr/>
+          <a:lstStyle/>
+          <a:p>
+            <a:endParaRPr lang="en-US"/>
+          </a:p>
+        </p:txBody>
+      </p:sp>
+      <p:pic>
+        <p:nvPicPr>
+          <p:cNvPr id="6" name="Picture 5">
+            <a:extLst>
+              <a:ext uri="{FF2B5EF4-FFF2-40B4-BE49-F238E27FC236}">
+                <a16:creationId xmlns:a16="http://schemas.microsoft.com/office/drawing/2014/main" id="{E420142D-970F-C24C-BF49-7332BE0B1BD8}"/>
+              </a:ext>
+            </a:extLst>
+          </p:cNvPr>
+          <p:cNvPicPr>
+            <a:picLocks noChangeAspect="1"/>
+          </p:cNvPicPr>
+          <p:nvPr/>
+        </p:nvPicPr>
+        <p:blipFill>
+          <a:blip r:embed="rId2"/>
+          <a:stretch>
+            <a:fillRect/>
+          </a:stretch>
+        </p:blipFill>
+        <p:spPr>
+          <a:xfrm>
+            <a:off x="1727200" y="1365250"/>
+            <a:ext cx="8737600" cy="4127500"/>
+          </a:xfrm>
+          <a:prstGeom prst="rect">
+            <a:avLst/>
+          </a:prstGeom>
+        </p:spPr>
+      </p:pic>
     </p:spTree>
     <p:extLst>
       <p:ext uri="{BB962C8B-B14F-4D97-AF65-F5344CB8AC3E}">
-        <p14:creationId xmlns:p14="http://schemas.microsoft.com/office/powerpoint/2010/main" val="1945904480"/>
+        <p14:creationId xmlns:p14="http://schemas.microsoft.com/office/powerpoint/2010/main" val="2203621143"/>
       </p:ext>
     </p:extLst>
   </p:cSld>
@@ -3857,7 +3846,7 @@
           <p:cNvPr id="2" name="Title 1">
             <a:extLst>
               <a:ext uri="{FF2B5EF4-FFF2-40B4-BE49-F238E27FC236}">
-                <a16:creationId xmlns:a16="http://schemas.microsoft.com/office/drawing/2014/main" id="{3460CED5-B400-CA45-9A8B-D92610E06BB5}"/>
+                <a16:creationId xmlns:a16="http://schemas.microsoft.com/office/drawing/2014/main" id="{164C3870-2BFF-1943-B8F6-A0FB3D27548B}"/>
               </a:ext>
             </a:extLst>
           </p:cNvPr>
@@ -3875,7 +3864,7 @@
           <a:p>
             <a:r>
               <a:rPr lang="en-US"/>
-              <a:t>Validating our pairs</a:t>
+              <a:t>Data</a:t>
             </a:r>
           </a:p>
         </p:txBody>
@@ -3885,7 +3874,7 @@
           <p:cNvPr id="3" name="Content Placeholder 2">
             <a:extLst>
               <a:ext uri="{FF2B5EF4-FFF2-40B4-BE49-F238E27FC236}">
-                <a16:creationId xmlns:a16="http://schemas.microsoft.com/office/drawing/2014/main" id="{993D91C2-D4B1-2F43-9107-E374FE7A73C8}"/>
+                <a16:creationId xmlns:a16="http://schemas.microsoft.com/office/drawing/2014/main" id="{E1B2D567-EF1B-DD4E-BC04-F1433C2DEBB3}"/>
               </a:ext>
             </a:extLst>
           </p:cNvPr>
@@ -3896,62 +3885,75 @@
             <p:ph idx="1"/>
           </p:nvPr>
         </p:nvSpPr>
-        <p:spPr>
-          <a:xfrm>
-            <a:off x="838200" y="1825625"/>
-            <a:ext cx="10515600" cy="4667250"/>
-          </a:xfrm>
-        </p:spPr>
+        <p:spPr/>
         <p:txBody>
           <a:bodyPr>
-            <a:normAutofit lnSpcReduction="10000"/>
+            <a:normAutofit fontScale="92500" lnSpcReduction="20000"/>
           </a:bodyPr>
           <a:lstStyle/>
           <a:p>
             <a:r>
               <a:rPr lang="en-US"/>
-              <a:t>Some respondents in the sample have a child who is also in the sample (inferred from genetics).</a:t>
-            </a:r>
-          </a:p>
-          <a:p>
-            <a:r>
-              <a:rPr lang="en-US"/>
-              <a:t>Among our spouse pairs, 511 have a genetic child of at least one partner in the sample. Of these, 441 (86%) are children of both partners.</a:t>
-            </a:r>
-          </a:p>
-          <a:p>
-            <a:r>
-              <a:rPr lang="en-US"/>
-              <a:t>Comparison: 11% of families with dependent children included a stepchild (Census 2011).</a:t>
-            </a:r>
-          </a:p>
-          <a:p>
-            <a:endParaRPr lang="en-US"/>
-          </a:p>
-          <a:p>
-            <a:r>
-              <a:rPr lang="en-US"/>
-              <a:t>We also estimate our models using “known fake pairs”. Coefficients are closer to zero than among our pairs. </a:t>
-            </a:r>
-          </a:p>
-          <a:p>
-            <a:r>
-              <a:rPr lang="en-US">
-                <a:sym typeface="Wingdings" pitchFamily="2" charset="2"/>
-              </a:rPr>
-              <a:t> </a:t>
-            </a:r>
-            <a:r>
-              <a:rPr lang="en-US"/>
-              <a:t>Remaining fakes in our data are likely to bias our coefficients to zero.</a:t>
-            </a:r>
+              <a:t>UK Biobank, a study of about 500,000 individuals born 1935-1970. Contains questionnaire data on health and social characteristics, also DNA data.</a:t>
+            </a:r>
+          </a:p>
+          <a:p>
+            <a:r>
+              <a:rPr lang="en-US"/>
+              <a:t>We don’t have explicit information on spouse pairs.</a:t>
+            </a:r>
+          </a:p>
+          <a:p>
+            <a:r>
+              <a:rPr lang="en-US"/>
+              <a:t>We categorize people as pairs if they:</a:t>
+            </a:r>
+          </a:p>
+          <a:p>
+            <a:r>
+              <a:rPr lang="en-GB"/>
+              <a:t>• had the same home postcode </a:t>
+            </a:r>
+          </a:p>
+          <a:p>
+            <a:r>
+              <a:rPr lang="en-GB"/>
+              <a:t>• have the same homeownership/renting status, length of time at the address, and number of children</a:t>
+            </a:r>
+          </a:p>
+          <a:p>
+            <a:r>
+              <a:rPr lang="en-GB"/>
+              <a:t>• attended the same UK Biobank assessment centre on the same day;</a:t>
+            </a:r>
+          </a:p>
+          <a:p>
+            <a:r>
+              <a:rPr lang="en-GB"/>
+              <a:t>• both reported living with their spouse (“husband, wife or partner”);</a:t>
+            </a:r>
+          </a:p>
+          <a:p>
+            <a:r>
+              <a:rPr lang="en-GB"/>
+              <a:t>• consisted of one male and one female.</a:t>
+            </a:r>
+          </a:p>
+          <a:p>
+            <a:r>
+              <a:rPr lang="en-GB"/>
+              <a:t> </a:t>
+            </a:r>
+          </a:p>
+          <a:p>
+            <a:endParaRPr lang="en-US"/>
           </a:p>
         </p:txBody>
       </p:sp>
     </p:spTree>
     <p:extLst>
       <p:ext uri="{BB962C8B-B14F-4D97-AF65-F5344CB8AC3E}">
-        <p14:creationId xmlns:p14="http://schemas.microsoft.com/office/powerpoint/2010/main" val="2770055961"/>
+        <p14:creationId xmlns:p14="http://schemas.microsoft.com/office/powerpoint/2010/main" val="1945904480"/>
       </p:ext>
     </p:extLst>
   </p:cSld>
@@ -3983,6 +3985,132 @@
           <p:cNvPr id="2" name="Title 1">
             <a:extLst>
               <a:ext uri="{FF2B5EF4-FFF2-40B4-BE49-F238E27FC236}">
+                <a16:creationId xmlns:a16="http://schemas.microsoft.com/office/drawing/2014/main" id="{3460CED5-B400-CA45-9A8B-D92610E06BB5}"/>
+              </a:ext>
+            </a:extLst>
+          </p:cNvPr>
+          <p:cNvSpPr>
+            <a:spLocks noGrp="1"/>
+          </p:cNvSpPr>
+          <p:nvPr>
+            <p:ph type="title"/>
+          </p:nvPr>
+        </p:nvSpPr>
+        <p:spPr/>
+        <p:txBody>
+          <a:bodyPr/>
+          <a:lstStyle/>
+          <a:p>
+            <a:r>
+              <a:rPr lang="en-US"/>
+              <a:t>Validating our pairs</a:t>
+            </a:r>
+          </a:p>
+        </p:txBody>
+      </p:sp>
+      <p:sp>
+        <p:nvSpPr>
+          <p:cNvPr id="3" name="Content Placeholder 2">
+            <a:extLst>
+              <a:ext uri="{FF2B5EF4-FFF2-40B4-BE49-F238E27FC236}">
+                <a16:creationId xmlns:a16="http://schemas.microsoft.com/office/drawing/2014/main" id="{993D91C2-D4B1-2F43-9107-E374FE7A73C8}"/>
+              </a:ext>
+            </a:extLst>
+          </p:cNvPr>
+          <p:cNvSpPr>
+            <a:spLocks noGrp="1"/>
+          </p:cNvSpPr>
+          <p:nvPr>
+            <p:ph idx="1"/>
+          </p:nvPr>
+        </p:nvSpPr>
+        <p:spPr>
+          <a:xfrm>
+            <a:off x="838200" y="1825625"/>
+            <a:ext cx="10515600" cy="4667250"/>
+          </a:xfrm>
+        </p:spPr>
+        <p:txBody>
+          <a:bodyPr>
+            <a:normAutofit lnSpcReduction="10000"/>
+          </a:bodyPr>
+          <a:lstStyle/>
+          <a:p>
+            <a:r>
+              <a:rPr lang="en-US"/>
+              <a:t>Some respondents in the sample have a child who is also in the sample (inferred from genetics).</a:t>
+            </a:r>
+          </a:p>
+          <a:p>
+            <a:r>
+              <a:rPr lang="en-US"/>
+              <a:t>Among our spouse pairs, 511 have a genetic child of at least one partner in the sample. Of these, 441 (86%) are children of both partners.</a:t>
+            </a:r>
+          </a:p>
+          <a:p>
+            <a:r>
+              <a:rPr lang="en-US"/>
+              <a:t>Comparison: 11% of families with dependent children included a stepchild (Census 2011).</a:t>
+            </a:r>
+          </a:p>
+          <a:p>
+            <a:endParaRPr lang="en-US"/>
+          </a:p>
+          <a:p>
+            <a:r>
+              <a:rPr lang="en-US"/>
+              <a:t>We also estimate our models using “known fake pairs”. Coefficients are closer to zero than among our pairs. </a:t>
+            </a:r>
+          </a:p>
+          <a:p>
+            <a:r>
+              <a:rPr lang="en-US">
+                <a:sym typeface="Wingdings" pitchFamily="2" charset="2"/>
+              </a:rPr>
+              <a:t> </a:t>
+            </a:r>
+            <a:r>
+              <a:rPr lang="en-US"/>
+              <a:t>Remaining fakes in our data are likely to bias our coefficients to zero.</a:t>
+            </a:r>
+          </a:p>
+        </p:txBody>
+      </p:sp>
+    </p:spTree>
+    <p:extLst>
+      <p:ext uri="{BB962C8B-B14F-4D97-AF65-F5344CB8AC3E}">
+        <p14:creationId xmlns:p14="http://schemas.microsoft.com/office/powerpoint/2010/main" val="2770055961"/>
+      </p:ext>
+    </p:extLst>
+  </p:cSld>
+  <p:clrMapOvr>
+    <a:masterClrMapping/>
+  </p:clrMapOvr>
+</p:sld>
+</file>
+
+<file path=ppt/slides/slide13.xml><?xml version="1.0" encoding="utf-8"?>
+<p:sld xmlns:a="http://schemas.openxmlformats.org/drawingml/2006/main" xmlns:r="http://schemas.openxmlformats.org/officeDocument/2006/relationships" xmlns:p="http://schemas.openxmlformats.org/presentationml/2006/main">
+  <p:cSld>
+    <p:spTree>
+      <p:nvGrpSpPr>
+        <p:cNvPr id="1" name=""/>
+        <p:cNvGrpSpPr/>
+        <p:nvPr/>
+      </p:nvGrpSpPr>
+      <p:grpSpPr>
+        <a:xfrm>
+          <a:off x="0" y="0"/>
+          <a:ext cx="0" cy="0"/>
+          <a:chOff x="0" y="0"/>
+          <a:chExt cx="0" cy="0"/>
+        </a:xfrm>
+      </p:grpSpPr>
+      <p:sp>
+        <p:nvSpPr>
+          <p:cNvPr id="2" name="Title 1">
+            <a:extLst>
+              <a:ext uri="{FF2B5EF4-FFF2-40B4-BE49-F238E27FC236}">
                 <a16:creationId xmlns:a16="http://schemas.microsoft.com/office/drawing/2014/main" id="{FEEE6753-167A-8849-BB44-7E1C01C79449}"/>
               </a:ext>
             </a:extLst>
@@ -4044,7 +4172,7 @@
 </p:sld>
 </file>
 
-<file path=ppt/slides/slide13.xml><?xml version="1.0" encoding="utf-8"?>
+<file path=ppt/slides/slide14.xml><?xml version="1.0" encoding="utf-8"?>
 <p:sld xmlns:a="http://schemas.openxmlformats.org/drawingml/2006/main" xmlns:r="http://schemas.openxmlformats.org/officeDocument/2006/relationships" xmlns:p="http://schemas.openxmlformats.org/presentationml/2006/main">
   <p:cSld>
     <p:spTree>
@@ -4154,7 +4282,7 @@
 </p:sld>
 </file>
 
-<file path=ppt/slides/slide14.xml><?xml version="1.0" encoding="utf-8"?>
+<file path=ppt/slides/slide15.xml><?xml version="1.0" encoding="utf-8"?>
 <p:sld xmlns:a="http://schemas.openxmlformats.org/drawingml/2006/main" xmlns:r="http://schemas.openxmlformats.org/officeDocument/2006/relationships" xmlns:p="http://schemas.openxmlformats.org/presentationml/2006/main">
   <p:cSld>
     <p:spTree>
@@ -4264,148 +4392,6 @@
 </p:sld>
 </file>
 
-<file path=ppt/slides/slide15.xml><?xml version="1.0" encoding="utf-8"?>
-<p:sld xmlns:a="http://schemas.openxmlformats.org/drawingml/2006/main" xmlns:r="http://schemas.openxmlformats.org/officeDocument/2006/relationships" xmlns:p="http://schemas.openxmlformats.org/presentationml/2006/main">
-  <p:cSld>
-    <p:spTree>
-      <p:nvGrpSpPr>
-        <p:cNvPr id="1" name=""/>
-        <p:cNvGrpSpPr/>
-        <p:nvPr/>
-      </p:nvGrpSpPr>
-      <p:grpSpPr>
-        <a:xfrm>
-          <a:off x="0" y="0"/>
-          <a:ext cx="0" cy="0"/>
-          <a:chOff x="0" y="0"/>
-          <a:chExt cx="0" cy="0"/>
-        </a:xfrm>
-      </p:grpSpPr>
-      <p:sp>
-        <p:nvSpPr>
-          <p:cNvPr id="3" name="Content Placeholder 2">
-            <a:extLst>
-              <a:ext uri="{FF2B5EF4-FFF2-40B4-BE49-F238E27FC236}">
-                <a16:creationId xmlns:a16="http://schemas.microsoft.com/office/drawing/2014/main" id="{84BDF347-8AB4-CD43-82C3-FD14B2D10AA8}"/>
-              </a:ext>
-            </a:extLst>
-          </p:cNvPr>
-          <p:cNvSpPr>
-            <a:spLocks noGrp="1"/>
-          </p:cNvSpPr>
-          <p:nvPr>
-            <p:ph idx="1"/>
-          </p:nvPr>
-        </p:nvSpPr>
-        <p:spPr>
-          <a:xfrm>
-            <a:off x="838200" y="642551"/>
-            <a:ext cx="10515600" cy="5534412"/>
-          </a:xfrm>
-        </p:spPr>
-        <p:txBody>
-          <a:bodyPr>
-            <a:normAutofit lnSpcReduction="10000"/>
-          </a:bodyPr>
-          <a:lstStyle/>
-          <a:p>
-            <a:r>
-              <a:rPr lang="en-US"/>
-              <a:t>We already know that there is assortative mating on PSEA (Hugh-Jones et al. 2016).</a:t>
-            </a:r>
-          </a:p>
-          <a:p>
-            <a:r>
-              <a:rPr lang="en-US"/>
-              <a:t>To avoid this confound, we need an independent variable which is</a:t>
-            </a:r>
-          </a:p>
-          <a:p>
-            <a:pPr marL="457200" indent="-457200">
-              <a:buFont typeface="Arial" panose="020B0604020202020204" pitchFamily="34" charset="0"/>
-              <a:buChar char="•"/>
-            </a:pPr>
-            <a:r>
-              <a:rPr lang="en-US"/>
-              <a:t>independent of genetics;</a:t>
-            </a:r>
-          </a:p>
-          <a:p>
-            <a:pPr marL="457200" indent="-457200">
-              <a:buFont typeface="Arial" panose="020B0604020202020204" pitchFamily="34" charset="0"/>
-              <a:buChar char="•"/>
-            </a:pPr>
-            <a:r>
-              <a:rPr lang="en-US"/>
-              <a:t>available for a large enough N.</a:t>
-            </a:r>
-          </a:p>
-          <a:p>
-            <a:pPr marL="457200" indent="-457200">
-              <a:buFont typeface="Arial" panose="020B0604020202020204" pitchFamily="34" charset="0"/>
-              <a:buChar char="•"/>
-            </a:pPr>
-            <a:endParaRPr lang="en-US"/>
-          </a:p>
-          <a:p>
-            <a:r>
-              <a:rPr lang="en-US"/>
-              <a:t>We use</a:t>
-            </a:r>
-            <a:r>
-              <a:rPr lang="en-US" b="1"/>
-              <a:t> birth order</a:t>
-            </a:r>
-            <a:r>
-              <a:rPr lang="en-US"/>
-              <a:t>.</a:t>
-            </a:r>
-          </a:p>
-          <a:p>
-            <a:pPr marL="457200" indent="-457200">
-              <a:buFont typeface="Arial" panose="020B0604020202020204" pitchFamily="34" charset="0"/>
-              <a:buChar char="•"/>
-            </a:pPr>
-            <a:r>
-              <a:rPr lang="en-US"/>
-              <a:t>Siblings have the same expected polygenic scores, by the “lottery of meiosis”. </a:t>
-            </a:r>
-          </a:p>
-          <a:p>
-            <a:pPr marL="457200" indent="-457200">
-              <a:buFont typeface="Arial" panose="020B0604020202020204" pitchFamily="34" charset="0"/>
-              <a:buChar char="•"/>
-            </a:pPr>
-            <a:r>
-              <a:rPr lang="en-US"/>
-              <a:t>Early-born siblings receive more parental care, have better life outcomes including educational attainment, SES </a:t>
-            </a:r>
-            <a:r>
-              <a:rPr lang="en-GB"/>
-              <a:t>(Lindahl 2008; Booth and Kee 2009; Black, Devereux, and Salvanes 2011). </a:t>
-            </a:r>
-          </a:p>
-          <a:p>
-            <a:endParaRPr lang="en-US"/>
-          </a:p>
-          <a:p>
-            <a:endParaRPr lang="en-US"/>
-          </a:p>
-        </p:txBody>
-      </p:sp>
-    </p:spTree>
-    <p:extLst>
-      <p:ext uri="{BB962C8B-B14F-4D97-AF65-F5344CB8AC3E}">
-        <p14:creationId xmlns:p14="http://schemas.microsoft.com/office/powerpoint/2010/main" val="1577209623"/>
-      </p:ext>
-    </p:extLst>
-  </p:cSld>
-  <p:clrMapOvr>
-    <a:masterClrMapping/>
-  </p:clrMapOvr>
-</p:sld>
-</file>
-
 <file path=ppt/slides/slide16.xml><?xml version="1.0" encoding="utf-8"?>
 <p:sld xmlns:a="http://schemas.openxmlformats.org/drawingml/2006/main" xmlns:r="http://schemas.openxmlformats.org/officeDocument/2006/relationships" xmlns:p="http://schemas.openxmlformats.org/presentationml/2006/main">
   <p:cSld>
@@ -4425,10 +4411,10 @@
       </p:grpSpPr>
       <p:sp>
         <p:nvSpPr>
-          <p:cNvPr id="2" name="Title 1">
+          <p:cNvPr id="3" name="Content Placeholder 2">
             <a:extLst>
               <a:ext uri="{FF2B5EF4-FFF2-40B4-BE49-F238E27FC236}">
-                <a16:creationId xmlns:a16="http://schemas.microsoft.com/office/drawing/2014/main" id="{D7135095-240A-1640-9AAA-A9531886AA06}"/>
+                <a16:creationId xmlns:a16="http://schemas.microsoft.com/office/drawing/2014/main" id="{84BDF347-8AB4-CD43-82C3-FD14B2D10AA8}"/>
               </a:ext>
             </a:extLst>
           </p:cNvPr>
@@ -4436,45 +4422,30 @@
             <a:spLocks noGrp="1"/>
           </p:cNvSpPr>
           <p:nvPr>
-            <p:ph type="title"/>
-          </p:nvPr>
-        </p:nvSpPr>
-        <p:spPr/>
-        <p:txBody>
-          <a:bodyPr/>
-          <a:lstStyle/>
-          <a:p>
-            <a:r>
-              <a:rPr lang="en-US"/>
-              <a:t>Estimation strategy</a:t>
-            </a:r>
-          </a:p>
-        </p:txBody>
-      </p:sp>
-      <p:sp>
-        <p:nvSpPr>
-          <p:cNvPr id="3" name="Content Placeholder 2">
-            <a:extLst>
-              <a:ext uri="{FF2B5EF4-FFF2-40B4-BE49-F238E27FC236}">
-                <a16:creationId xmlns:a16="http://schemas.microsoft.com/office/drawing/2014/main" id="{A51E1777-8E43-0E46-9CE8-FE69FF1A779F}"/>
-              </a:ext>
-            </a:extLst>
-          </p:cNvPr>
-          <p:cNvSpPr>
-            <a:spLocks noGrp="1"/>
-          </p:cNvSpPr>
-          <p:nvPr>
             <p:ph idx="1"/>
           </p:nvPr>
         </p:nvSpPr>
-        <p:spPr/>
-        <p:txBody>
-          <a:bodyPr/>
-          <a:lstStyle/>
-          <a:p>
-            <a:r>
-              <a:rPr lang="en-US"/>
-              <a:t>Hard to justify IV:</a:t>
+        <p:spPr>
+          <a:xfrm>
+            <a:off x="838200" y="642551"/>
+            <a:ext cx="10515600" cy="5534412"/>
+          </a:xfrm>
+        </p:spPr>
+        <p:txBody>
+          <a:bodyPr>
+            <a:normAutofit lnSpcReduction="10000"/>
+          </a:bodyPr>
+          <a:lstStyle/>
+          <a:p>
+            <a:r>
+              <a:rPr lang="en-US"/>
+              <a:t>We already know that there is assortative mating on PSEA (Hugh-Jones et al. 2016).</a:t>
+            </a:r>
+          </a:p>
+          <a:p>
+            <a:r>
+              <a:rPr lang="en-US"/>
+              <a:t>To avoid this confound, we need an independent variable which is</a:t>
             </a:r>
           </a:p>
           <a:p>
@@ -4484,7 +4455,7 @@
             </a:pPr>
             <a:r>
               <a:rPr lang="en-US"/>
-              <a:t>Birth order probably affects other things than SES.</a:t>
+              <a:t>independent of genetics;</a:t>
             </a:r>
           </a:p>
           <a:p>
@@ -4494,16 +4465,7 @@
             </a:pPr>
             <a:r>
               <a:rPr lang="en-US"/>
-              <a:t>We only have imperfect measures of SES (rough household income, job, educational attainment).</a:t>
-            </a:r>
-          </a:p>
-          <a:p>
-            <a:endParaRPr lang="en-US"/>
-          </a:p>
-          <a:p>
-            <a:r>
-              <a:rPr lang="en-US"/>
-              <a:t>Instead we run a mediation analysis:</a:t>
+              <a:t>available for a large enough N.</a:t>
             </a:r>
           </a:p>
           <a:p>
@@ -4511,9 +4473,20 @@
               <a:buFont typeface="Arial" panose="020B0604020202020204" pitchFamily="34" charset="0"/>
               <a:buChar char="•"/>
             </a:pPr>
-            <a:r>
-              <a:rPr lang="en-US"/>
-              <a:t>Does birth order affect spouse’s PSEA?</a:t>
+            <a:endParaRPr lang="en-US"/>
+          </a:p>
+          <a:p>
+            <a:r>
+              <a:rPr lang="en-US"/>
+              <a:t>We use</a:t>
+            </a:r>
+            <a:r>
+              <a:rPr lang="en-US" b="1"/>
+              <a:t> birth order</a:t>
+            </a:r>
+            <a:r>
+              <a:rPr lang="en-US"/>
+              <a:t>.</a:t>
             </a:r>
           </a:p>
           <a:p>
@@ -4523,15 +4496,35 @@
             </a:pPr>
             <a:r>
               <a:rPr lang="en-US"/>
-              <a:t>Is the effect mediated by measures of SES?</a:t>
-            </a:r>
+              <a:t>Siblings have the same expected polygenic scores, by the “lottery of meiosis”. </a:t>
+            </a:r>
+          </a:p>
+          <a:p>
+            <a:pPr marL="457200" indent="-457200">
+              <a:buFont typeface="Arial" panose="020B0604020202020204" pitchFamily="34" charset="0"/>
+              <a:buChar char="•"/>
+            </a:pPr>
+            <a:r>
+              <a:rPr lang="en-US"/>
+              <a:t>Early-born siblings receive more parental care, have better life outcomes including educational attainment, SES </a:t>
+            </a:r>
+            <a:r>
+              <a:rPr lang="en-GB"/>
+              <a:t>(Lindahl 2008; Booth and Kee 2009; Black, Devereux, and Salvanes 2011). </a:t>
+            </a:r>
+          </a:p>
+          <a:p>
+            <a:endParaRPr lang="en-US"/>
+          </a:p>
+          <a:p>
+            <a:endParaRPr lang="en-US"/>
           </a:p>
         </p:txBody>
       </p:sp>
     </p:spTree>
     <p:extLst>
       <p:ext uri="{BB962C8B-B14F-4D97-AF65-F5344CB8AC3E}">
-        <p14:creationId xmlns:p14="http://schemas.microsoft.com/office/powerpoint/2010/main" val="3924092187"/>
+        <p14:creationId xmlns:p14="http://schemas.microsoft.com/office/powerpoint/2010/main" val="1577209623"/>
       </p:ext>
     </p:extLst>
   </p:cSld>
@@ -4563,6 +4556,141 @@
           <p:cNvPr id="2" name="Title 1">
             <a:extLst>
               <a:ext uri="{FF2B5EF4-FFF2-40B4-BE49-F238E27FC236}">
+                <a16:creationId xmlns:a16="http://schemas.microsoft.com/office/drawing/2014/main" id="{D7135095-240A-1640-9AAA-A9531886AA06}"/>
+              </a:ext>
+            </a:extLst>
+          </p:cNvPr>
+          <p:cNvSpPr>
+            <a:spLocks noGrp="1"/>
+          </p:cNvSpPr>
+          <p:nvPr>
+            <p:ph type="title"/>
+          </p:nvPr>
+        </p:nvSpPr>
+        <p:spPr/>
+        <p:txBody>
+          <a:bodyPr/>
+          <a:lstStyle/>
+          <a:p>
+            <a:r>
+              <a:rPr lang="en-US"/>
+              <a:t>Estimation strategy</a:t>
+            </a:r>
+          </a:p>
+        </p:txBody>
+      </p:sp>
+      <p:sp>
+        <p:nvSpPr>
+          <p:cNvPr id="3" name="Content Placeholder 2">
+            <a:extLst>
+              <a:ext uri="{FF2B5EF4-FFF2-40B4-BE49-F238E27FC236}">
+                <a16:creationId xmlns:a16="http://schemas.microsoft.com/office/drawing/2014/main" id="{A51E1777-8E43-0E46-9CE8-FE69FF1A779F}"/>
+              </a:ext>
+            </a:extLst>
+          </p:cNvPr>
+          <p:cNvSpPr>
+            <a:spLocks noGrp="1"/>
+          </p:cNvSpPr>
+          <p:nvPr>
+            <p:ph idx="1"/>
+          </p:nvPr>
+        </p:nvSpPr>
+        <p:spPr/>
+        <p:txBody>
+          <a:bodyPr/>
+          <a:lstStyle/>
+          <a:p>
+            <a:r>
+              <a:rPr lang="en-US"/>
+              <a:t>Hard to justify IV:</a:t>
+            </a:r>
+          </a:p>
+          <a:p>
+            <a:pPr marL="457200" indent="-457200">
+              <a:buFont typeface="Arial" panose="020B0604020202020204" pitchFamily="34" charset="0"/>
+              <a:buChar char="•"/>
+            </a:pPr>
+            <a:r>
+              <a:rPr lang="en-US"/>
+              <a:t>Birth order probably affects other things than SES.</a:t>
+            </a:r>
+          </a:p>
+          <a:p>
+            <a:pPr marL="457200" indent="-457200">
+              <a:buFont typeface="Arial" panose="020B0604020202020204" pitchFamily="34" charset="0"/>
+              <a:buChar char="•"/>
+            </a:pPr>
+            <a:r>
+              <a:rPr lang="en-US"/>
+              <a:t>We only have imperfect measures of SES (rough household income, job, educational attainment).</a:t>
+            </a:r>
+          </a:p>
+          <a:p>
+            <a:endParaRPr lang="en-US"/>
+          </a:p>
+          <a:p>
+            <a:r>
+              <a:rPr lang="en-US"/>
+              <a:t>Instead we run a mediation analysis:</a:t>
+            </a:r>
+          </a:p>
+          <a:p>
+            <a:pPr marL="457200" indent="-457200">
+              <a:buFont typeface="Arial" panose="020B0604020202020204" pitchFamily="34" charset="0"/>
+              <a:buChar char="•"/>
+            </a:pPr>
+            <a:r>
+              <a:rPr lang="en-US"/>
+              <a:t>Does birth order affect spouse’s PSEA?</a:t>
+            </a:r>
+          </a:p>
+          <a:p>
+            <a:pPr marL="457200" indent="-457200">
+              <a:buFont typeface="Arial" panose="020B0604020202020204" pitchFamily="34" charset="0"/>
+              <a:buChar char="•"/>
+            </a:pPr>
+            <a:r>
+              <a:rPr lang="en-US"/>
+              <a:t>Is the effect mediated by measures of SES?</a:t>
+            </a:r>
+          </a:p>
+        </p:txBody>
+      </p:sp>
+    </p:spTree>
+    <p:extLst>
+      <p:ext uri="{BB962C8B-B14F-4D97-AF65-F5344CB8AC3E}">
+        <p14:creationId xmlns:p14="http://schemas.microsoft.com/office/powerpoint/2010/main" val="3924092187"/>
+      </p:ext>
+    </p:extLst>
+  </p:cSld>
+  <p:clrMapOvr>
+    <a:masterClrMapping/>
+  </p:clrMapOvr>
+</p:sld>
+</file>
+
+<file path=ppt/slides/slide18.xml><?xml version="1.0" encoding="utf-8"?>
+<p:sld xmlns:a="http://schemas.openxmlformats.org/drawingml/2006/main" xmlns:r="http://schemas.openxmlformats.org/officeDocument/2006/relationships" xmlns:p="http://schemas.openxmlformats.org/presentationml/2006/main">
+  <p:cSld>
+    <p:spTree>
+      <p:nvGrpSpPr>
+        <p:cNvPr id="1" name=""/>
+        <p:cNvGrpSpPr/>
+        <p:nvPr/>
+      </p:nvGrpSpPr>
+      <p:grpSpPr>
+        <a:xfrm>
+          <a:off x="0" y="0"/>
+          <a:ext cx="0" cy="0"/>
+          <a:chOff x="0" y="0"/>
+          <a:chExt cx="0" cy="0"/>
+        </a:xfrm>
+      </p:grpSpPr>
+      <p:sp>
+        <p:nvSpPr>
+          <p:cNvPr id="2" name="Title 1">
+            <a:extLst>
+              <a:ext uri="{FF2B5EF4-FFF2-40B4-BE49-F238E27FC236}">
                 <a16:creationId xmlns:a16="http://schemas.microsoft.com/office/drawing/2014/main" id="{DC65CD4B-5CAA-3540-AD8B-8CABA011E09B}"/>
               </a:ext>
             </a:extLst>
@@ -4674,7 +4802,7 @@
 </p:sld>
 </file>
 
-<file path=ppt/slides/slide18.xml><?xml version="1.0" encoding="utf-8"?>
+<file path=ppt/slides/slide19.xml><?xml version="1.0" encoding="utf-8"?>
 <p:sld xmlns:a="http://schemas.openxmlformats.org/drawingml/2006/main" xmlns:r="http://schemas.openxmlformats.org/officeDocument/2006/relationships" xmlns:p="http://schemas.openxmlformats.org/presentationml/2006/main">
   <p:cSld>
     <p:spTree>
@@ -4784,7 +4912,157 @@
 </p:sld>
 </file>
 
-<file path=ppt/slides/slide19.xml><?xml version="1.0" encoding="utf-8"?>
+<file path=ppt/slides/slide2.xml><?xml version="1.0" encoding="utf-8"?>
+<p:sld xmlns:a="http://schemas.openxmlformats.org/drawingml/2006/main" xmlns:r="http://schemas.openxmlformats.org/officeDocument/2006/relationships" xmlns:p="http://schemas.openxmlformats.org/presentationml/2006/main">
+  <p:cSld>
+    <p:spTree>
+      <p:nvGrpSpPr>
+        <p:cNvPr id="1" name=""/>
+        <p:cNvGrpSpPr/>
+        <p:nvPr/>
+      </p:nvGrpSpPr>
+      <p:grpSpPr>
+        <a:xfrm>
+          <a:off x="0" y="0"/>
+          <a:ext cx="0" cy="0"/>
+          <a:chOff x="0" y="0"/>
+          <a:chExt cx="0" cy="0"/>
+        </a:xfrm>
+      </p:grpSpPr>
+      <p:sp>
+        <p:nvSpPr>
+          <p:cNvPr id="2" name="Title 1">
+            <a:extLst>
+              <a:ext uri="{FF2B5EF4-FFF2-40B4-BE49-F238E27FC236}">
+                <a16:creationId xmlns:a16="http://schemas.microsoft.com/office/drawing/2014/main" id="{50182F33-7F8D-C64C-AD38-F458A33CC326}"/>
+              </a:ext>
+            </a:extLst>
+          </p:cNvPr>
+          <p:cNvSpPr>
+            <a:spLocks noGrp="1"/>
+          </p:cNvSpPr>
+          <p:nvPr>
+            <p:ph type="title"/>
+          </p:nvPr>
+        </p:nvSpPr>
+        <p:spPr/>
+        <p:txBody>
+          <a:bodyPr/>
+          <a:lstStyle/>
+          <a:p>
+            <a:endParaRPr lang="en-US"/>
+          </a:p>
+        </p:txBody>
+      </p:sp>
+      <p:sp>
+        <p:nvSpPr>
+          <p:cNvPr id="3" name="Content Placeholder 2">
+            <a:extLst>
+              <a:ext uri="{FF2B5EF4-FFF2-40B4-BE49-F238E27FC236}">
+                <a16:creationId xmlns:a16="http://schemas.microsoft.com/office/drawing/2014/main" id="{2C4406B3-6F2D-0949-8DA5-08C091265E5E}"/>
+              </a:ext>
+            </a:extLst>
+          </p:cNvPr>
+          <p:cNvSpPr>
+            <a:spLocks noGrp="1"/>
+          </p:cNvSpPr>
+          <p:nvPr>
+            <p:ph idx="1"/>
+          </p:nvPr>
+        </p:nvSpPr>
+        <p:spPr/>
+        <p:txBody>
+          <a:bodyPr>
+            <a:normAutofit lnSpcReduction="10000"/>
+          </a:bodyPr>
+          <a:lstStyle/>
+          <a:p>
+            <a:r>
+              <a:rPr lang="en-US"/>
+              <a:t>Basic thesis of modern behavioural genetics:</a:t>
+            </a:r>
+          </a:p>
+          <a:p>
+            <a:r>
+              <a:rPr lang="en-US" b="1"/>
+              <a:t>Genetic data explains social outcomes.</a:t>
+            </a:r>
+          </a:p>
+          <a:p>
+            <a:pPr marL="457200" indent="-457200">
+              <a:buFont typeface="Arial" panose="020B0604020202020204" pitchFamily="34" charset="0"/>
+              <a:buChar char="•"/>
+            </a:pPr>
+            <a:r>
+              <a:rPr lang="en-US"/>
+              <a:t>What’s a social scientist to do?</a:t>
+            </a:r>
+          </a:p>
+          <a:p>
+            <a:endParaRPr lang="en-US"/>
+          </a:p>
+          <a:p>
+            <a:r>
+              <a:rPr lang="en-US"/>
+              <a:t>One answer: find out where the genes come from.</a:t>
+            </a:r>
+          </a:p>
+          <a:p>
+            <a:pPr marL="457200" indent="-457200">
+              <a:buFont typeface="Arial" panose="020B0604020202020204" pitchFamily="34" charset="0"/>
+              <a:buChar char="•"/>
+            </a:pPr>
+            <a:r>
+              <a:rPr lang="en-US"/>
+              <a:t>Genetic assortative mating (Hugh-Jones et al. 2016).</a:t>
+            </a:r>
+          </a:p>
+          <a:p>
+            <a:pPr marL="457200" indent="-457200">
+              <a:buFont typeface="Arial" panose="020B0604020202020204" pitchFamily="34" charset="0"/>
+              <a:buChar char="•"/>
+            </a:pPr>
+            <a:r>
+              <a:rPr lang="en-US"/>
+              <a:t>Geographic sorting (Abdellaoui et al. 2019).</a:t>
+            </a:r>
+          </a:p>
+          <a:p>
+            <a:pPr marL="457200" indent="-457200">
+              <a:buFont typeface="Arial" panose="020B0604020202020204" pitchFamily="34" charset="0"/>
+              <a:buChar char="•"/>
+            </a:pPr>
+            <a:r>
+              <a:rPr lang="en-US"/>
+              <a:t>Natural selection (Hugh-Jones and Abdellaoui 2021, working paper).</a:t>
+            </a:r>
+          </a:p>
+          <a:p>
+            <a:pPr marL="457200" indent="-457200">
+              <a:buFont typeface="Arial" panose="020B0604020202020204" pitchFamily="34" charset="0"/>
+              <a:buChar char="•"/>
+            </a:pPr>
+            <a:r>
+              <a:rPr lang="en-US"/>
+              <a:t>This paper.</a:t>
+            </a:r>
+          </a:p>
+        </p:txBody>
+      </p:sp>
+    </p:spTree>
+    <p:extLst>
+      <p:ext uri="{BB962C8B-B14F-4D97-AF65-F5344CB8AC3E}">
+        <p14:creationId xmlns:p14="http://schemas.microsoft.com/office/powerpoint/2010/main" val="4280399063"/>
+      </p:ext>
+    </p:extLst>
+  </p:cSld>
+  <p:clrMapOvr>
+    <a:masterClrMapping/>
+  </p:clrMapOvr>
+</p:sld>
+</file>
+
+<file path=ppt/slides/slide20.xml><?xml version="1.0" encoding="utf-8"?>
 <p:sld xmlns:a="http://schemas.openxmlformats.org/drawingml/2006/main" xmlns:r="http://schemas.openxmlformats.org/officeDocument/2006/relationships" xmlns:p="http://schemas.openxmlformats.org/presentationml/2006/main">
   <p:cSld>
     <p:spTree>
@@ -4894,157 +5172,7 @@
 </p:sld>
 </file>
 
-<file path=ppt/slides/slide2.xml><?xml version="1.0" encoding="utf-8"?>
-<p:sld xmlns:a="http://schemas.openxmlformats.org/drawingml/2006/main" xmlns:r="http://schemas.openxmlformats.org/officeDocument/2006/relationships" xmlns:p="http://schemas.openxmlformats.org/presentationml/2006/main">
-  <p:cSld>
-    <p:spTree>
-      <p:nvGrpSpPr>
-        <p:cNvPr id="1" name=""/>
-        <p:cNvGrpSpPr/>
-        <p:nvPr/>
-      </p:nvGrpSpPr>
-      <p:grpSpPr>
-        <a:xfrm>
-          <a:off x="0" y="0"/>
-          <a:ext cx="0" cy="0"/>
-          <a:chOff x="0" y="0"/>
-          <a:chExt cx="0" cy="0"/>
-        </a:xfrm>
-      </p:grpSpPr>
-      <p:sp>
-        <p:nvSpPr>
-          <p:cNvPr id="2" name="Title 1">
-            <a:extLst>
-              <a:ext uri="{FF2B5EF4-FFF2-40B4-BE49-F238E27FC236}">
-                <a16:creationId xmlns:a16="http://schemas.microsoft.com/office/drawing/2014/main" id="{50182F33-7F8D-C64C-AD38-F458A33CC326}"/>
-              </a:ext>
-            </a:extLst>
-          </p:cNvPr>
-          <p:cNvSpPr>
-            <a:spLocks noGrp="1"/>
-          </p:cNvSpPr>
-          <p:nvPr>
-            <p:ph type="title"/>
-          </p:nvPr>
-        </p:nvSpPr>
-        <p:spPr/>
-        <p:txBody>
-          <a:bodyPr/>
-          <a:lstStyle/>
-          <a:p>
-            <a:endParaRPr lang="en-US"/>
-          </a:p>
-        </p:txBody>
-      </p:sp>
-      <p:sp>
-        <p:nvSpPr>
-          <p:cNvPr id="3" name="Content Placeholder 2">
-            <a:extLst>
-              <a:ext uri="{FF2B5EF4-FFF2-40B4-BE49-F238E27FC236}">
-                <a16:creationId xmlns:a16="http://schemas.microsoft.com/office/drawing/2014/main" id="{2C4406B3-6F2D-0949-8DA5-08C091265E5E}"/>
-              </a:ext>
-            </a:extLst>
-          </p:cNvPr>
-          <p:cNvSpPr>
-            <a:spLocks noGrp="1"/>
-          </p:cNvSpPr>
-          <p:nvPr>
-            <p:ph idx="1"/>
-          </p:nvPr>
-        </p:nvSpPr>
-        <p:spPr/>
-        <p:txBody>
-          <a:bodyPr>
-            <a:normAutofit lnSpcReduction="10000"/>
-          </a:bodyPr>
-          <a:lstStyle/>
-          <a:p>
-            <a:r>
-              <a:rPr lang="en-US"/>
-              <a:t>Basic thesis of modern behavioural genetics:</a:t>
-            </a:r>
-          </a:p>
-          <a:p>
-            <a:r>
-              <a:rPr lang="en-US" b="1"/>
-              <a:t>Genetic data explains social outcomes.</a:t>
-            </a:r>
-          </a:p>
-          <a:p>
-            <a:pPr marL="457200" indent="-457200">
-              <a:buFont typeface="Arial" panose="020B0604020202020204" pitchFamily="34" charset="0"/>
-              <a:buChar char="•"/>
-            </a:pPr>
-            <a:r>
-              <a:rPr lang="en-US"/>
-              <a:t>What’s a social scientist to do?</a:t>
-            </a:r>
-          </a:p>
-          <a:p>
-            <a:endParaRPr lang="en-US"/>
-          </a:p>
-          <a:p>
-            <a:r>
-              <a:rPr lang="en-US"/>
-              <a:t>One answer: ask where the genes come from.</a:t>
-            </a:r>
-          </a:p>
-          <a:p>
-            <a:pPr marL="457200" indent="-457200">
-              <a:buFont typeface="Arial" panose="020B0604020202020204" pitchFamily="34" charset="0"/>
-              <a:buChar char="•"/>
-            </a:pPr>
-            <a:r>
-              <a:rPr lang="en-US"/>
-              <a:t>Genetic assortative mating (Hugh-Jones et al. 2016).</a:t>
-            </a:r>
-          </a:p>
-          <a:p>
-            <a:pPr marL="457200" indent="-457200">
-              <a:buFont typeface="Arial" panose="020B0604020202020204" pitchFamily="34" charset="0"/>
-              <a:buChar char="•"/>
-            </a:pPr>
-            <a:r>
-              <a:rPr lang="en-US"/>
-              <a:t>Geographic sorting (Abdellaoui et al. 2019).</a:t>
-            </a:r>
-          </a:p>
-          <a:p>
-            <a:pPr marL="457200" indent="-457200">
-              <a:buFont typeface="Arial" panose="020B0604020202020204" pitchFamily="34" charset="0"/>
-              <a:buChar char="•"/>
-            </a:pPr>
-            <a:r>
-              <a:rPr lang="en-US"/>
-              <a:t>Natural selection (Hugh-Jones and Abdellaoui 2021, working paper)</a:t>
-            </a:r>
-          </a:p>
-          <a:p>
-            <a:pPr marL="457200" indent="-457200">
-              <a:buFont typeface="Arial" panose="020B0604020202020204" pitchFamily="34" charset="0"/>
-              <a:buChar char="•"/>
-            </a:pPr>
-            <a:r>
-              <a:rPr lang="en-US"/>
-              <a:t>This paper.</a:t>
-            </a:r>
-          </a:p>
-        </p:txBody>
-      </p:sp>
-    </p:spTree>
-    <p:extLst>
-      <p:ext uri="{BB962C8B-B14F-4D97-AF65-F5344CB8AC3E}">
-        <p14:creationId xmlns:p14="http://schemas.microsoft.com/office/powerpoint/2010/main" val="4280399063"/>
-      </p:ext>
-    </p:extLst>
-  </p:cSld>
-  <p:clrMapOvr>
-    <a:masterClrMapping/>
-  </p:clrMapOvr>
-</p:sld>
-</file>
-
-<file path=ppt/slides/slide20.xml><?xml version="1.0" encoding="utf-8"?>
+<file path=ppt/slides/slide21.xml><?xml version="1.0" encoding="utf-8"?>
 <p:sld xmlns:a="http://schemas.openxmlformats.org/drawingml/2006/main" xmlns:r="http://schemas.openxmlformats.org/officeDocument/2006/relationships" xmlns:p="http://schemas.openxmlformats.org/presentationml/2006/main">
   <p:cSld>
     <p:spTree>
@@ -5154,7 +5282,7 @@
 </p:sld>
 </file>
 
-<file path=ppt/slides/slide21.xml><?xml version="1.0" encoding="utf-8"?>
+<file path=ppt/slides/slide22.xml><?xml version="1.0" encoding="utf-8"?>
 <p:sld xmlns:a="http://schemas.openxmlformats.org/drawingml/2006/main" xmlns:r="http://schemas.openxmlformats.org/officeDocument/2006/relationships" xmlns:p="http://schemas.openxmlformats.org/presentationml/2006/main">
   <p:cSld>
     <p:spTree>
@@ -5371,6 +5499,52 @@
           </a:p>
         </p:txBody>
       </p:sp>
+      <p:sp>
+        <p:nvSpPr>
+          <p:cNvPr id="2" name="Rectangle 1">
+            <a:extLst>
+              <a:ext uri="{FF2B5EF4-FFF2-40B4-BE49-F238E27FC236}">
+                <a16:creationId xmlns:a16="http://schemas.microsoft.com/office/drawing/2014/main" id="{E0BB25F0-FBAD-7246-AB22-45E9537F2B46}"/>
+              </a:ext>
+            </a:extLst>
+          </p:cNvPr>
+          <p:cNvSpPr/>
+          <p:nvPr/>
+        </p:nvSpPr>
+        <p:spPr>
+          <a:xfrm>
+            <a:off x="6442841" y="367862"/>
+            <a:ext cx="3031943" cy="6127531"/>
+          </a:xfrm>
+          <a:prstGeom prst="rect">
+            <a:avLst/>
+          </a:prstGeom>
+        </p:spPr>
+        <p:style>
+          <a:lnRef idx="2">
+            <a:schemeClr val="dk1">
+              <a:shade val="50000"/>
+            </a:schemeClr>
+          </a:lnRef>
+          <a:fillRef idx="1">
+            <a:schemeClr val="dk1"/>
+          </a:fillRef>
+          <a:effectRef idx="0">
+            <a:schemeClr val="dk1"/>
+          </a:effectRef>
+          <a:fontRef idx="minor">
+            <a:schemeClr val="lt1"/>
+          </a:fontRef>
+        </p:style>
+        <p:txBody>
+          <a:bodyPr rtlCol="0" anchor="ctr"/>
+          <a:lstStyle/>
+          <a:p>
+            <a:pPr algn="ctr"/>
+            <a:endParaRPr lang="en-US"/>
+          </a:p>
+        </p:txBody>
+      </p:sp>
     </p:spTree>
     <p:extLst>
       <p:ext uri="{BB962C8B-B14F-4D97-AF65-F5344CB8AC3E}">
@@ -5381,10 +5555,206 @@
   <p:clrMapOvr>
     <a:masterClrMapping/>
   </p:clrMapOvr>
+  <p:timing>
+    <p:tnLst>
+      <p:par>
+        <p:cTn id="1" dur="indefinite" restart="never" nodeType="tmRoot">
+          <p:childTnLst>
+            <p:seq concurrent="1" nextAc="seek">
+              <p:cTn id="2" dur="indefinite" nodeType="mainSeq">
+                <p:childTnLst>
+                  <p:par>
+                    <p:cTn id="3" fill="hold">
+                      <p:stCondLst>
+                        <p:cond delay="indefinite"/>
+                      </p:stCondLst>
+                      <p:childTnLst>
+                        <p:par>
+                          <p:cTn id="4" fill="hold">
+                            <p:stCondLst>
+                              <p:cond delay="0"/>
+                            </p:stCondLst>
+                            <p:childTnLst>
+                              <p:par>
+                                <p:cTn id="5" presetID="2" presetClass="exit" presetSubtype="2" fill="hold" grpId="0" nodeType="clickEffect">
+                                  <p:stCondLst>
+                                    <p:cond delay="0"/>
+                                  </p:stCondLst>
+                                  <p:childTnLst>
+                                    <p:anim calcmode="lin" valueType="num">
+                                      <p:cBhvr additive="base">
+                                        <p:cTn id="6" dur="500"/>
+                                        <p:tgtEl>
+                                          <p:spTgt spid="2"/>
+                                        </p:tgtEl>
+                                        <p:attrNameLst>
+                                          <p:attrName>ppt_x</p:attrName>
+                                        </p:attrNameLst>
+                                      </p:cBhvr>
+                                      <p:tavLst>
+                                        <p:tav tm="0">
+                                          <p:val>
+                                            <p:strVal val="ppt_x"/>
+                                          </p:val>
+                                        </p:tav>
+                                        <p:tav tm="100000">
+                                          <p:val>
+                                            <p:strVal val="1+ppt_w/2"/>
+                                          </p:val>
+                                        </p:tav>
+                                      </p:tavLst>
+                                    </p:anim>
+                                    <p:anim calcmode="lin" valueType="num">
+                                      <p:cBhvr additive="base">
+                                        <p:cTn id="7" dur="500"/>
+                                        <p:tgtEl>
+                                          <p:spTgt spid="2"/>
+                                        </p:tgtEl>
+                                        <p:attrNameLst>
+                                          <p:attrName>ppt_y</p:attrName>
+                                        </p:attrNameLst>
+                                      </p:cBhvr>
+                                      <p:tavLst>
+                                        <p:tav tm="0">
+                                          <p:val>
+                                            <p:strVal val="ppt_y"/>
+                                          </p:val>
+                                        </p:tav>
+                                        <p:tav tm="100000">
+                                          <p:val>
+                                            <p:strVal val="ppt_y"/>
+                                          </p:val>
+                                        </p:tav>
+                                      </p:tavLst>
+                                    </p:anim>
+                                    <p:set>
+                                      <p:cBhvr>
+                                        <p:cTn id="8" dur="1" fill="hold">
+                                          <p:stCondLst>
+                                            <p:cond delay="499"/>
+                                          </p:stCondLst>
+                                        </p:cTn>
+                                        <p:tgtEl>
+                                          <p:spTgt spid="2"/>
+                                        </p:tgtEl>
+                                        <p:attrNameLst>
+                                          <p:attrName>style.visibility</p:attrName>
+                                        </p:attrNameLst>
+                                      </p:cBhvr>
+                                      <p:to>
+                                        <p:strVal val="hidden"/>
+                                      </p:to>
+                                    </p:set>
+                                  </p:childTnLst>
+                                </p:cTn>
+                              </p:par>
+                              <p:par>
+                                <p:cTn id="9" presetID="9" presetClass="entr" presetSubtype="0" fill="hold" grpId="0" nodeType="withEffect">
+                                  <p:stCondLst>
+                                    <p:cond delay="0"/>
+                                  </p:stCondLst>
+                                  <p:childTnLst>
+                                    <p:set>
+                                      <p:cBhvr>
+                                        <p:cTn id="10" dur="1" fill="hold">
+                                          <p:stCondLst>
+                                            <p:cond delay="0"/>
+                                          </p:stCondLst>
+                                        </p:cTn>
+                                        <p:tgtEl>
+                                          <p:spTgt spid="8"/>
+                                        </p:tgtEl>
+                                        <p:attrNameLst>
+                                          <p:attrName>style.visibility</p:attrName>
+                                        </p:attrNameLst>
+                                      </p:cBhvr>
+                                      <p:to>
+                                        <p:strVal val="visible"/>
+                                      </p:to>
+                                    </p:set>
+                                    <p:animEffect transition="in" filter="dissolve">
+                                      <p:cBhvr>
+                                        <p:cTn id="11" dur="500"/>
+                                        <p:tgtEl>
+                                          <p:spTgt spid="8"/>
+                                        </p:tgtEl>
+                                      </p:cBhvr>
+                                    </p:animEffect>
+                                  </p:childTnLst>
+                                </p:cTn>
+                              </p:par>
+                              <p:par>
+                                <p:cTn id="12" presetID="9" presetClass="entr" presetSubtype="0" fill="hold" grpId="0" nodeType="withEffect">
+                                  <p:stCondLst>
+                                    <p:cond delay="0"/>
+                                  </p:stCondLst>
+                                  <p:childTnLst>
+                                    <p:set>
+                                      <p:cBhvr>
+                                        <p:cTn id="13" dur="1" fill="hold">
+                                          <p:stCondLst>
+                                            <p:cond delay="0"/>
+                                          </p:stCondLst>
+                                        </p:cTn>
+                                        <p:tgtEl>
+                                          <p:spTgt spid="6"/>
+                                        </p:tgtEl>
+                                        <p:attrNameLst>
+                                          <p:attrName>style.visibility</p:attrName>
+                                        </p:attrNameLst>
+                                      </p:cBhvr>
+                                      <p:to>
+                                        <p:strVal val="visible"/>
+                                      </p:to>
+                                    </p:set>
+                                    <p:animEffect transition="in" filter="dissolve">
+                                      <p:cBhvr>
+                                        <p:cTn id="14" dur="500"/>
+                                        <p:tgtEl>
+                                          <p:spTgt spid="6"/>
+                                        </p:tgtEl>
+                                      </p:cBhvr>
+                                    </p:animEffect>
+                                  </p:childTnLst>
+                                </p:cTn>
+                              </p:par>
+                            </p:childTnLst>
+                          </p:cTn>
+                        </p:par>
+                      </p:childTnLst>
+                    </p:cTn>
+                  </p:par>
+                </p:childTnLst>
+              </p:cTn>
+              <p:prevCondLst>
+                <p:cond evt="onPrev" delay="0">
+                  <p:tgtEl>
+                    <p:sldTgt/>
+                  </p:tgtEl>
+                </p:cond>
+              </p:prevCondLst>
+              <p:nextCondLst>
+                <p:cond evt="onNext" delay="0">
+                  <p:tgtEl>
+                    <p:sldTgt/>
+                  </p:tgtEl>
+                </p:cond>
+              </p:nextCondLst>
+            </p:seq>
+          </p:childTnLst>
+        </p:cTn>
+      </p:par>
+    </p:tnLst>
+    <p:bldLst>
+      <p:bldP spid="6" grpId="0"/>
+      <p:bldP spid="8" grpId="0" animBg="1"/>
+      <p:bldP spid="2" grpId="0" animBg="1"/>
+    </p:bldLst>
+  </p:timing>
 </p:sld>
 </file>
 
-<file path=ppt/slides/slide22.xml><?xml version="1.0" encoding="utf-8"?>
+<file path=ppt/slides/slide23.xml><?xml version="1.0" encoding="utf-8"?>
 <p:sld xmlns:a="http://schemas.openxmlformats.org/drawingml/2006/main" xmlns:r="http://schemas.openxmlformats.org/officeDocument/2006/relationships" xmlns:p="http://schemas.openxmlformats.org/presentationml/2006/main">
   <p:cSld>
     <p:spTree>
@@ -5494,125 +5864,6 @@
 </p:sld>
 </file>
 
-<file path=ppt/slides/slide23.xml><?xml version="1.0" encoding="utf-8"?>
-<p:sld xmlns:a="http://schemas.openxmlformats.org/drawingml/2006/main" xmlns:r="http://schemas.openxmlformats.org/officeDocument/2006/relationships" xmlns:p="http://schemas.openxmlformats.org/presentationml/2006/main">
-  <p:cSld>
-    <p:spTree>
-      <p:nvGrpSpPr>
-        <p:cNvPr id="1" name=""/>
-        <p:cNvGrpSpPr/>
-        <p:nvPr/>
-      </p:nvGrpSpPr>
-      <p:grpSpPr>
-        <a:xfrm>
-          <a:off x="0" y="0"/>
-          <a:ext cx="0" cy="0"/>
-          <a:chOff x="0" y="0"/>
-          <a:chExt cx="0" cy="0"/>
-        </a:xfrm>
-      </p:grpSpPr>
-      <p:sp>
-        <p:nvSpPr>
-          <p:cNvPr id="2" name="Title 1">
-            <a:extLst>
-              <a:ext uri="{FF2B5EF4-FFF2-40B4-BE49-F238E27FC236}">
-                <a16:creationId xmlns:a16="http://schemas.microsoft.com/office/drawing/2014/main" id="{46DDD3B0-A396-8547-9305-2C3B9AA9C6EE}"/>
-              </a:ext>
-            </a:extLst>
-          </p:cNvPr>
-          <p:cNvSpPr>
-            <a:spLocks noGrp="1"/>
-          </p:cNvSpPr>
-          <p:nvPr>
-            <p:ph type="title"/>
-          </p:nvPr>
-        </p:nvSpPr>
-        <p:spPr/>
-        <p:txBody>
-          <a:bodyPr/>
-          <a:lstStyle/>
-          <a:p>
-            <a:endParaRPr lang="en-US"/>
-          </a:p>
-        </p:txBody>
-      </p:sp>
-      <p:sp>
-        <p:nvSpPr>
-          <p:cNvPr id="3" name="Content Placeholder 2">
-            <a:extLst>
-              <a:ext uri="{FF2B5EF4-FFF2-40B4-BE49-F238E27FC236}">
-                <a16:creationId xmlns:a16="http://schemas.microsoft.com/office/drawing/2014/main" id="{0F43C2B3-BBB0-B14B-AD9E-8D8C2933B1CF}"/>
-              </a:ext>
-            </a:extLst>
-          </p:cNvPr>
-          <p:cNvSpPr>
-            <a:spLocks noGrp="1"/>
-          </p:cNvSpPr>
-          <p:nvPr>
-            <p:ph idx="1"/>
-          </p:nvPr>
-        </p:nvSpPr>
-        <p:spPr/>
-        <p:txBody>
-          <a:bodyPr/>
-          <a:lstStyle/>
-          <a:p>
-            <a:r>
-              <a:rPr lang="en-US"/>
-              <a:t>Assortative mating in marriage markets can explain the genes-status gradient.</a:t>
-            </a:r>
-          </a:p>
-          <a:p>
-            <a:pPr marL="457200" indent="-457200">
-              <a:buFont typeface="Arial" panose="020B0604020202020204" pitchFamily="34" charset="0"/>
-              <a:buChar char="•"/>
-            </a:pPr>
-            <a:r>
-              <a:rPr lang="en-US"/>
-              <a:t>This explanation applies to a wider range of societies than the key rival.</a:t>
-            </a:r>
-          </a:p>
-          <a:p>
-            <a:pPr marL="457200" indent="-457200">
-              <a:buFont typeface="Arial" panose="020B0604020202020204" pitchFamily="34" charset="0"/>
-              <a:buChar char="•"/>
-            </a:pPr>
-            <a:r>
-              <a:rPr lang="en-US"/>
-              <a:t>Prediction: genes-status gradient should be visible in ancient DNA.</a:t>
-            </a:r>
-          </a:p>
-          <a:p>
-            <a:r>
-              <a:rPr lang="en-US"/>
-              <a:t>Shocks to socio-economic status are reflected in the DNA of descendants.</a:t>
-            </a:r>
-          </a:p>
-          <a:p>
-            <a:pPr marL="457200" indent="-457200">
-              <a:buFont typeface="Arial" panose="020B0604020202020204" pitchFamily="34" charset="0"/>
-              <a:buChar char="•"/>
-            </a:pPr>
-            <a:r>
-              <a:rPr lang="en-US"/>
-              <a:t>Part of how elite families maintain their position over time (Clark 2015)?</a:t>
-            </a:r>
-          </a:p>
-        </p:txBody>
-      </p:sp>
-    </p:spTree>
-    <p:extLst>
-      <p:ext uri="{BB962C8B-B14F-4D97-AF65-F5344CB8AC3E}">
-        <p14:creationId xmlns:p14="http://schemas.microsoft.com/office/powerpoint/2010/main" val="3469657122"/>
-      </p:ext>
-    </p:extLst>
-  </p:cSld>
-  <p:clrMapOvr>
-    <a:masterClrMapping/>
-  </p:clrMapOvr>
-</p:sld>
-</file>
-
 <file path=ppt/slides/slide24.xml><?xml version="1.0" encoding="utf-8"?>
 <p:sld xmlns:a="http://schemas.openxmlformats.org/drawingml/2006/main" xmlns:r="http://schemas.openxmlformats.org/officeDocument/2006/relationships" xmlns:p="http://schemas.openxmlformats.org/presentationml/2006/main">
   <p:cSld>
@@ -5635,6 +5886,125 @@
           <p:cNvPr id="2" name="Title 1">
             <a:extLst>
               <a:ext uri="{FF2B5EF4-FFF2-40B4-BE49-F238E27FC236}">
+                <a16:creationId xmlns:a16="http://schemas.microsoft.com/office/drawing/2014/main" id="{46DDD3B0-A396-8547-9305-2C3B9AA9C6EE}"/>
+              </a:ext>
+            </a:extLst>
+          </p:cNvPr>
+          <p:cNvSpPr>
+            <a:spLocks noGrp="1"/>
+          </p:cNvSpPr>
+          <p:nvPr>
+            <p:ph type="title"/>
+          </p:nvPr>
+        </p:nvSpPr>
+        <p:spPr/>
+        <p:txBody>
+          <a:bodyPr/>
+          <a:lstStyle/>
+          <a:p>
+            <a:endParaRPr lang="en-US"/>
+          </a:p>
+        </p:txBody>
+      </p:sp>
+      <p:sp>
+        <p:nvSpPr>
+          <p:cNvPr id="3" name="Content Placeholder 2">
+            <a:extLst>
+              <a:ext uri="{FF2B5EF4-FFF2-40B4-BE49-F238E27FC236}">
+                <a16:creationId xmlns:a16="http://schemas.microsoft.com/office/drawing/2014/main" id="{0F43C2B3-BBB0-B14B-AD9E-8D8C2933B1CF}"/>
+              </a:ext>
+            </a:extLst>
+          </p:cNvPr>
+          <p:cNvSpPr>
+            <a:spLocks noGrp="1"/>
+          </p:cNvSpPr>
+          <p:nvPr>
+            <p:ph idx="1"/>
+          </p:nvPr>
+        </p:nvSpPr>
+        <p:spPr/>
+        <p:txBody>
+          <a:bodyPr/>
+          <a:lstStyle/>
+          <a:p>
+            <a:r>
+              <a:rPr lang="en-US"/>
+              <a:t>Assortative mating in marriage markets can explain the genes-status gradient.</a:t>
+            </a:r>
+          </a:p>
+          <a:p>
+            <a:pPr marL="457200" indent="-457200">
+              <a:buFont typeface="Arial" panose="020B0604020202020204" pitchFamily="34" charset="0"/>
+              <a:buChar char="•"/>
+            </a:pPr>
+            <a:r>
+              <a:rPr lang="en-US"/>
+              <a:t>This explanation applies to a wider range of societies than the key rival.</a:t>
+            </a:r>
+          </a:p>
+          <a:p>
+            <a:pPr marL="457200" indent="-457200">
+              <a:buFont typeface="Arial" panose="020B0604020202020204" pitchFamily="34" charset="0"/>
+              <a:buChar char="•"/>
+            </a:pPr>
+            <a:r>
+              <a:rPr lang="en-US"/>
+              <a:t>Prediction: genes-status gradient should be visible in ancient DNA.</a:t>
+            </a:r>
+          </a:p>
+          <a:p>
+            <a:r>
+              <a:rPr lang="en-US"/>
+              <a:t>Shocks to socio-economic status are reflected in the DNA of descendants.</a:t>
+            </a:r>
+          </a:p>
+          <a:p>
+            <a:pPr marL="457200" indent="-457200">
+              <a:buFont typeface="Arial" panose="020B0604020202020204" pitchFamily="34" charset="0"/>
+              <a:buChar char="•"/>
+            </a:pPr>
+            <a:r>
+              <a:rPr lang="en-US"/>
+              <a:t>Part of how elite families maintain their position over time (Clark 2015)?</a:t>
+            </a:r>
+          </a:p>
+        </p:txBody>
+      </p:sp>
+    </p:spTree>
+    <p:extLst>
+      <p:ext uri="{BB962C8B-B14F-4D97-AF65-F5344CB8AC3E}">
+        <p14:creationId xmlns:p14="http://schemas.microsoft.com/office/powerpoint/2010/main" val="3469657122"/>
+      </p:ext>
+    </p:extLst>
+  </p:cSld>
+  <p:clrMapOvr>
+    <a:masterClrMapping/>
+  </p:clrMapOvr>
+</p:sld>
+</file>
+
+<file path=ppt/slides/slide25.xml><?xml version="1.0" encoding="utf-8"?>
+<p:sld xmlns:a="http://schemas.openxmlformats.org/drawingml/2006/main" xmlns:r="http://schemas.openxmlformats.org/officeDocument/2006/relationships" xmlns:p="http://schemas.openxmlformats.org/presentationml/2006/main">
+  <p:cSld>
+    <p:spTree>
+      <p:nvGrpSpPr>
+        <p:cNvPr id="1" name=""/>
+        <p:cNvGrpSpPr/>
+        <p:nvPr/>
+      </p:nvGrpSpPr>
+      <p:grpSpPr>
+        <a:xfrm>
+          <a:off x="0" y="0"/>
+          <a:ext cx="0" cy="0"/>
+          <a:chOff x="0" y="0"/>
+          <a:chExt cx="0" cy="0"/>
+        </a:xfrm>
+      </p:grpSpPr>
+      <p:sp>
+        <p:nvSpPr>
+          <p:cNvPr id="2" name="Title 1">
+            <a:extLst>
+              <a:ext uri="{FF2B5EF4-FFF2-40B4-BE49-F238E27FC236}">
                 <a16:creationId xmlns:a16="http://schemas.microsoft.com/office/drawing/2014/main" id="{06C5A175-6E56-674F-9574-B1D1065B2BC7}"/>
               </a:ext>
             </a:extLst>
@@ -5678,7 +6048,13 @@
           <a:p>
             <a:r>
               <a:rPr lang="en-US"/>
-              <a:t>Popular discourse and the media (and scientists!) often oppose “nature” to “nurture”. The idea is that DNA is fixed at conception and affects individual outcomes thereafter.</a:t>
+              <a:t>Popular discourse and the media (and scientists!) often oppose “nature” to “nurture”. </a:t>
+            </a:r>
+          </a:p>
+          <a:p>
+            <a:r>
+              <a:rPr lang="en-US"/>
+              <a:t>The idea is that DNA is fixed at conception, and affects individual outcomes thereafter.</a:t>
             </a:r>
           </a:p>
           <a:p>
@@ -5710,7 +6086,7 @@
 </p:sld>
 </file>
 
-<file path=ppt/slides/slide25.xml><?xml version="1.0" encoding="utf-8"?>
+<file path=ppt/slides/slide26.xml><?xml version="1.0" encoding="utf-8"?>
 <p:sld xmlns:a="http://schemas.openxmlformats.org/drawingml/2006/main" xmlns:r="http://schemas.openxmlformats.org/officeDocument/2006/relationships" xmlns:p="http://schemas.openxmlformats.org/presentationml/2006/main">
   <p:cSld>
     <p:spTree>
@@ -5815,78 +6191,25 @@
         </p:spPr>
         <p:txBody>
           <a:bodyPr>
-            <a:normAutofit fontScale="92500" lnSpcReduction="20000"/>
+            <a:normAutofit/>
           </a:bodyPr>
           <a:lstStyle/>
           <a:p>
             <a:r>
               <a:rPr lang="en-US"/>
-              <a:t>Inequality persists over generations.</a:t>
-            </a:r>
-          </a:p>
-          <a:p>
-            <a:r>
-              <a:rPr lang="en-US"/>
-              <a:t>Families are part of the reason why. Wealth, human capital and other traits are passed from parents to children.</a:t>
+              <a:t>Inequality persists over generations. It can be surprisingly persistent over time (Clark and Simmons 2015; Solon 2018).</a:t>
+            </a:r>
+          </a:p>
+          <a:p>
+            <a:r>
+              <a:rPr lang="en-US"/>
+              <a:t>Families are part of the mechanism, since wealth, human capital and other traits are passed from parents to children.</a:t>
             </a:r>
           </a:p>
           <a:p>
             <a:r>
               <a:rPr lang="en-US"/>
               <a:t>Assortative mating (where like marries like) can increase inequality (Fernandez and Rogerson 200; Fernandez et al. 2005; Schwartz and Mare 2005; Greenwood et al. 2014; Eika et al. 2019).</a:t>
-            </a:r>
-          </a:p>
-          <a:p>
-            <a:endParaRPr lang="en-US"/>
-          </a:p>
-          <a:p>
-            <a:r>
-              <a:rPr lang="en-US"/>
-              <a:t>Human genetics are also inherited, and help to explain inequality:</a:t>
-            </a:r>
-          </a:p>
-          <a:p>
-            <a:pPr marL="457200" indent="-457200">
-              <a:buFont typeface="Arial" panose="020B0604020202020204" pitchFamily="34" charset="0"/>
-              <a:buChar char="•"/>
-            </a:pPr>
-            <a:r>
-              <a:rPr lang="en-US"/>
-              <a:t>Heritability of occupational class and educational attainment is about 50% (Tambs et al. 1989).</a:t>
-            </a:r>
-          </a:p>
-          <a:p>
-            <a:pPr marL="457200" indent="-457200">
-              <a:buFont typeface="Arial" panose="020B0604020202020204" pitchFamily="34" charset="0"/>
-              <a:buChar char="•"/>
-            </a:pPr>
-            <a:r>
-              <a:rPr lang="en-US"/>
-              <a:t>2-year-old children’s family socio-economic status can be predicted from their genes (Trzaskowski et al. 2014).</a:t>
-            </a:r>
-          </a:p>
-          <a:p>
-            <a:pPr marL="457200" indent="-457200">
-              <a:buFont typeface="Arial" panose="020B0604020202020204" pitchFamily="34" charset="0"/>
-              <a:buChar char="•"/>
-            </a:pPr>
-            <a:r>
-              <a:rPr lang="en-US"/>
-              <a:t>Polygenic scores for educational attainment predict occupational class (Rimfeld et al. 2018).</a:t>
-            </a:r>
-          </a:p>
-          <a:p>
-            <a:r>
-              <a:rPr lang="en-US"/>
-              <a:t>The leading explanation for this </a:t>
-            </a:r>
-            <a:r>
-              <a:rPr lang="en-US" b="1"/>
-              <a:t>gene-status gradient </a:t>
-            </a:r>
-            <a:r>
-              <a:rPr lang="en-US"/>
-              <a:t>is meritocracy. “Good genes” lead to upward mobility.</a:t>
             </a:r>
           </a:p>
         </p:txBody>
@@ -5926,6 +6249,136 @@
           <p:cNvPr id="2" name="Title 1">
             <a:extLst>
               <a:ext uri="{FF2B5EF4-FFF2-40B4-BE49-F238E27FC236}">
+                <a16:creationId xmlns:a16="http://schemas.microsoft.com/office/drawing/2014/main" id="{DC39A669-2457-AA4B-90D4-2A983166A563}"/>
+              </a:ext>
+            </a:extLst>
+          </p:cNvPr>
+          <p:cNvSpPr>
+            <a:spLocks noGrp="1"/>
+          </p:cNvSpPr>
+          <p:nvPr>
+            <p:ph type="title"/>
+          </p:nvPr>
+        </p:nvSpPr>
+        <p:spPr/>
+        <p:txBody>
+          <a:bodyPr/>
+          <a:lstStyle/>
+          <a:p>
+            <a:endParaRPr lang="en-US"/>
+          </a:p>
+        </p:txBody>
+      </p:sp>
+      <p:sp>
+        <p:nvSpPr>
+          <p:cNvPr id="3" name="Content Placeholder 2">
+            <a:extLst>
+              <a:ext uri="{FF2B5EF4-FFF2-40B4-BE49-F238E27FC236}">
+                <a16:creationId xmlns:a16="http://schemas.microsoft.com/office/drawing/2014/main" id="{C0CE346D-6DEC-E642-80CC-C968A2EBBF00}"/>
+              </a:ext>
+            </a:extLst>
+          </p:cNvPr>
+          <p:cNvSpPr>
+            <a:spLocks noGrp="1"/>
+          </p:cNvSpPr>
+          <p:nvPr>
+            <p:ph idx="1"/>
+          </p:nvPr>
+        </p:nvSpPr>
+        <p:spPr/>
+        <p:txBody>
+          <a:bodyPr/>
+          <a:lstStyle/>
+          <a:p>
+            <a:r>
+              <a:rPr lang="en-US"/>
+              <a:t>Human genetics are also inherited, and help to explain inequality:</a:t>
+            </a:r>
+          </a:p>
+          <a:p>
+            <a:pPr marL="457200" indent="-457200">
+              <a:buFont typeface="Arial" panose="020B0604020202020204" pitchFamily="34" charset="0"/>
+              <a:buChar char="•"/>
+            </a:pPr>
+            <a:r>
+              <a:rPr lang="en-US"/>
+              <a:t>Heritability of occupational class and educational attainment is about 50% (Tambs et al. 1989).</a:t>
+            </a:r>
+          </a:p>
+          <a:p>
+            <a:pPr marL="457200" indent="-457200">
+              <a:buFont typeface="Arial" panose="020B0604020202020204" pitchFamily="34" charset="0"/>
+              <a:buChar char="•"/>
+            </a:pPr>
+            <a:r>
+              <a:rPr lang="en-US"/>
+              <a:t>2-year-old children’s family socio-economic status can be predicted from their genes (Trzaskowski et al. 2014).</a:t>
+            </a:r>
+          </a:p>
+          <a:p>
+            <a:pPr marL="457200" indent="-457200">
+              <a:buFont typeface="Arial" panose="020B0604020202020204" pitchFamily="34" charset="0"/>
+              <a:buChar char="•"/>
+            </a:pPr>
+            <a:r>
+              <a:rPr lang="en-US"/>
+              <a:t>Polygenic scores for educational attainment predict occupational class (Rimfeld et al. 2018).</a:t>
+            </a:r>
+          </a:p>
+          <a:p>
+            <a:r>
+              <a:rPr lang="en-US"/>
+              <a:t>The leading explanation for this </a:t>
+            </a:r>
+            <a:r>
+              <a:rPr lang="en-US" b="1"/>
+              <a:t>gene-status gradient </a:t>
+            </a:r>
+            <a:r>
+              <a:rPr lang="en-US"/>
+              <a:t>is meritocracy. “Good genes” lead to upward mobility.</a:t>
+            </a:r>
+          </a:p>
+          <a:p>
+            <a:endParaRPr lang="en-US"/>
+          </a:p>
+        </p:txBody>
+      </p:sp>
+    </p:spTree>
+    <p:extLst>
+      <p:ext uri="{BB962C8B-B14F-4D97-AF65-F5344CB8AC3E}">
+        <p14:creationId xmlns:p14="http://schemas.microsoft.com/office/powerpoint/2010/main" val="916761215"/>
+      </p:ext>
+    </p:extLst>
+  </p:cSld>
+  <p:clrMapOvr>
+    <a:masterClrMapping/>
+  </p:clrMapOvr>
+</p:sld>
+</file>
+
+<file path=ppt/slides/slide5.xml><?xml version="1.0" encoding="utf-8"?>
+<p:sld xmlns:a="http://schemas.openxmlformats.org/drawingml/2006/main" xmlns:r="http://schemas.openxmlformats.org/officeDocument/2006/relationships" xmlns:p="http://schemas.openxmlformats.org/presentationml/2006/main">
+  <p:cSld>
+    <p:spTree>
+      <p:nvGrpSpPr>
+        <p:cNvPr id="1" name=""/>
+        <p:cNvGrpSpPr/>
+        <p:nvPr/>
+      </p:nvGrpSpPr>
+      <p:grpSpPr>
+        <a:xfrm>
+          <a:off x="0" y="0"/>
+          <a:ext cx="0" cy="0"/>
+          <a:chOff x="0" y="0"/>
+          <a:chExt cx="0" cy="0"/>
+        </a:xfrm>
+      </p:grpSpPr>
+      <p:sp>
+        <p:nvSpPr>
+          <p:cNvPr id="2" name="Title 1">
+            <a:extLst>
+              <a:ext uri="{FF2B5EF4-FFF2-40B4-BE49-F238E27FC236}">
                 <a16:creationId xmlns:a16="http://schemas.microsoft.com/office/drawing/2014/main" id="{6BF664EC-2638-B641-A1CE-9D2987344785}"/>
               </a:ext>
             </a:extLst>
@@ -6031,7 +6484,7 @@
 </p:sld>
 </file>
 
-<file path=ppt/slides/slide5.xml><?xml version="1.0" encoding="utf-8"?>
+<file path=ppt/slides/slide6.xml><?xml version="1.0" encoding="utf-8"?>
 <p:sld xmlns:a="http://schemas.openxmlformats.org/drawingml/2006/main" xmlns:r="http://schemas.openxmlformats.org/officeDocument/2006/relationships" xmlns:p="http://schemas.openxmlformats.org/presentationml/2006/main">
   <p:cSld>
     <p:spTree>
@@ -6157,7 +6610,7 @@
 </p:sld>
 </file>
 
-<file path=ppt/slides/slide6.xml><?xml version="1.0" encoding="utf-8"?>
+<file path=ppt/slides/slide7.xml><?xml version="1.0" encoding="utf-8"?>
 <p:sld xmlns:a="http://schemas.openxmlformats.org/drawingml/2006/main" xmlns:r="http://schemas.openxmlformats.org/officeDocument/2006/relationships" xmlns:p="http://schemas.openxmlformats.org/presentationml/2006/main">
   <p:cSld>
     <p:spTree>
@@ -6303,237 +6756,6 @@
 </p:sld>
 </file>
 
-<file path=ppt/slides/slide7.xml><?xml version="1.0" encoding="utf-8"?>
-<p:sld xmlns:a="http://schemas.openxmlformats.org/drawingml/2006/main" xmlns:r="http://schemas.openxmlformats.org/officeDocument/2006/relationships" xmlns:p="http://schemas.openxmlformats.org/presentationml/2006/main">
-  <p:cSld>
-    <p:spTree>
-      <p:nvGrpSpPr>
-        <p:cNvPr id="1" name=""/>
-        <p:cNvGrpSpPr/>
-        <p:nvPr/>
-      </p:nvGrpSpPr>
-      <p:grpSpPr>
-        <a:xfrm>
-          <a:off x="0" y="0"/>
-          <a:ext cx="0" cy="0"/>
-          <a:chOff x="0" y="0"/>
-          <a:chExt cx="0" cy="0"/>
-        </a:xfrm>
-      </p:grpSpPr>
-      <p:sp>
-        <p:nvSpPr>
-          <p:cNvPr id="2" name="Title 1">
-            <a:extLst>
-              <a:ext uri="{FF2B5EF4-FFF2-40B4-BE49-F238E27FC236}">
-                <a16:creationId xmlns:a16="http://schemas.microsoft.com/office/drawing/2014/main" id="{8A7D6DD1-34AF-334B-8C97-85821665D802}"/>
-              </a:ext>
-            </a:extLst>
-          </p:cNvPr>
-          <p:cNvSpPr>
-            <a:spLocks noGrp="1"/>
-          </p:cNvSpPr>
-          <p:nvPr>
-            <p:ph type="title"/>
-          </p:nvPr>
-        </p:nvSpPr>
-        <p:spPr/>
-        <p:txBody>
-          <a:bodyPr/>
-          <a:lstStyle/>
-          <a:p>
-            <a:r>
-              <a:rPr lang="en-US"/>
-              <a:t>Theory</a:t>
-            </a:r>
-          </a:p>
-        </p:txBody>
-      </p:sp>
-      <p:sp>
-        <p:nvSpPr>
-          <p:cNvPr id="5" name="Content Placeholder 4">
-            <a:extLst>
-              <a:ext uri="{FF2B5EF4-FFF2-40B4-BE49-F238E27FC236}">
-                <a16:creationId xmlns:a16="http://schemas.microsoft.com/office/drawing/2014/main" id="{4620696C-C601-6346-85B8-9D306E30E785}"/>
-              </a:ext>
-            </a:extLst>
-          </p:cNvPr>
-          <p:cNvSpPr>
-            <a:spLocks noGrp="1"/>
-          </p:cNvSpPr>
-          <p:nvPr>
-            <p:ph idx="1"/>
-          </p:nvPr>
-        </p:nvSpPr>
-        <p:spPr/>
-        <p:txBody>
-          <a:bodyPr>
-            <a:normAutofit/>
-          </a:bodyPr>
-          <a:lstStyle/>
-          <a:p>
-            <a:r>
-              <a:rPr lang="en-US"/>
-              <a:t>Individuals in a large population have a genetic trait </a:t>
-            </a:r>
-            <a:r>
-              <a:rPr lang="en-US">
-                <a:solidFill>
-                  <a:schemeClr val="accent1"/>
-                </a:solidFill>
-              </a:rPr>
-              <a:t>g</a:t>
-            </a:r>
-            <a:r>
-              <a:rPr lang="en-US"/>
-              <a:t> and a social status </a:t>
-            </a:r>
-            <a:r>
-              <a:rPr lang="en-US">
-                <a:solidFill>
-                  <a:schemeClr val="accent1"/>
-                </a:solidFill>
-              </a:rPr>
-              <a:t>s</a:t>
-            </a:r>
-            <a:r>
-              <a:rPr lang="en-US"/>
-              <a:t> drawn from continuous* distributions </a:t>
-            </a:r>
-            <a:r>
-              <a:rPr lang="en-US">
-                <a:solidFill>
-                  <a:schemeClr val="accent1"/>
-                </a:solidFill>
-              </a:rPr>
-              <a:t>G</a:t>
-            </a:r>
-            <a:r>
-              <a:rPr lang="en-US"/>
-              <a:t>, </a:t>
-            </a:r>
-            <a:r>
-              <a:rPr lang="en-US">
-                <a:solidFill>
-                  <a:schemeClr val="accent1"/>
-                </a:solidFill>
-              </a:rPr>
-              <a:t>S</a:t>
-            </a:r>
-            <a:r>
-              <a:rPr lang="en-US"/>
-              <a:t>. </a:t>
-            </a:r>
-          </a:p>
-          <a:p>
-            <a:r>
-              <a:rPr lang="en-US"/>
-              <a:t>They match according to an attractiveness function</a:t>
-            </a:r>
-          </a:p>
-          <a:p>
-            <a:pPr algn="ctr"/>
-            <a:r>
-              <a:rPr lang="en-US">
-                <a:solidFill>
-                  <a:schemeClr val="accent1"/>
-                </a:solidFill>
-              </a:rPr>
-              <a:t>A(g, s) = f((1-k)g, ks)</a:t>
-            </a:r>
-          </a:p>
-          <a:p>
-            <a:endParaRPr lang="en-US"/>
-          </a:p>
-          <a:p>
-            <a:r>
-              <a:rPr lang="en-US">
-                <a:solidFill>
-                  <a:schemeClr val="accent1"/>
-                </a:solidFill>
-              </a:rPr>
-              <a:t>f</a:t>
-            </a:r>
-            <a:r>
-              <a:rPr lang="en-US"/>
-              <a:t> is increasing in its arguments</a:t>
-            </a:r>
-            <a:endParaRPr lang="en-US">
-              <a:solidFill>
-                <a:schemeClr val="accent1"/>
-              </a:solidFill>
-            </a:endParaRPr>
-          </a:p>
-          <a:p>
-            <a:r>
-              <a:rPr lang="en-US">
-                <a:solidFill>
-                  <a:schemeClr val="accent1"/>
-                </a:solidFill>
-              </a:rPr>
-              <a:t>k</a:t>
-            </a:r>
-            <a:r>
-              <a:rPr lang="en-US"/>
-              <a:t> describes the society’s marriage market. If </a:t>
-            </a:r>
-            <a:r>
-              <a:rPr lang="en-US">
-                <a:solidFill>
-                  <a:schemeClr val="accent1"/>
-                </a:solidFill>
-              </a:rPr>
-              <a:t>k = 0</a:t>
-            </a:r>
-            <a:r>
-              <a:rPr lang="en-US"/>
-              <a:t>, only genetics matter. If </a:t>
-            </a:r>
-            <a:r>
-              <a:rPr lang="en-US">
-                <a:solidFill>
-                  <a:schemeClr val="accent1"/>
-                </a:solidFill>
-              </a:rPr>
-              <a:t>k = 1</a:t>
-            </a:r>
-            <a:r>
-              <a:rPr lang="en-US"/>
-              <a:t>, only social status matters. For realistic societies, </a:t>
-            </a:r>
-            <a:r>
-              <a:rPr lang="en-US">
-                <a:solidFill>
-                  <a:schemeClr val="accent1"/>
-                </a:solidFill>
-              </a:rPr>
-              <a:t>0 &lt; k &lt; 1</a:t>
-            </a:r>
-            <a:r>
-              <a:rPr lang="en-US"/>
-              <a:t>.</a:t>
-            </a:r>
-          </a:p>
-          <a:p>
-            <a:r>
-              <a:rPr lang="en-US"/>
-              <a:t>  </a:t>
-            </a:r>
-          </a:p>
-        </p:txBody>
-      </p:sp>
-    </p:spTree>
-    <p:extLst>
-      <p:ext uri="{BB962C8B-B14F-4D97-AF65-F5344CB8AC3E}">
-        <p14:creationId xmlns:p14="http://schemas.microsoft.com/office/powerpoint/2010/main" val="4002184248"/>
-      </p:ext>
-    </p:extLst>
-  </p:cSld>
-  <p:clrMapOvr>
-    <a:masterClrMapping/>
-  </p:clrMapOvr>
-</p:sld>
-</file>
-
 <file path=ppt/slides/slide8.xml><?xml version="1.0" encoding="utf-8"?>
 <p:sld xmlns:a="http://schemas.openxmlformats.org/drawingml/2006/main" xmlns:r="http://schemas.openxmlformats.org/officeDocument/2006/relationships" xmlns:p="http://schemas.openxmlformats.org/presentationml/2006/main">
   <p:cSld>
@@ -6553,10 +6775,10 @@
       </p:grpSpPr>
       <p:sp>
         <p:nvSpPr>
-          <p:cNvPr id="3" name="Content Placeholder 2">
+          <p:cNvPr id="2" name="Title 1">
             <a:extLst>
               <a:ext uri="{FF2B5EF4-FFF2-40B4-BE49-F238E27FC236}">
-                <a16:creationId xmlns:a16="http://schemas.microsoft.com/office/drawing/2014/main" id="{780E3212-209C-6444-880F-EEFC66F4C19B}"/>
+                <a16:creationId xmlns:a16="http://schemas.microsoft.com/office/drawing/2014/main" id="{8A7D6DD1-34AF-334B-8C97-85821665D802}"/>
               </a:ext>
             </a:extLst>
           </p:cNvPr>
@@ -6564,15 +6786,38 @@
             <a:spLocks noGrp="1"/>
           </p:cNvSpPr>
           <p:nvPr>
+            <p:ph type="title"/>
+          </p:nvPr>
+        </p:nvSpPr>
+        <p:spPr/>
+        <p:txBody>
+          <a:bodyPr/>
+          <a:lstStyle/>
+          <a:p>
+            <a:r>
+              <a:rPr lang="en-US"/>
+              <a:t>Theory</a:t>
+            </a:r>
+          </a:p>
+        </p:txBody>
+      </p:sp>
+      <p:sp>
+        <p:nvSpPr>
+          <p:cNvPr id="5" name="Content Placeholder 4">
+            <a:extLst>
+              <a:ext uri="{FF2B5EF4-FFF2-40B4-BE49-F238E27FC236}">
+                <a16:creationId xmlns:a16="http://schemas.microsoft.com/office/drawing/2014/main" id="{4620696C-C601-6346-85B8-9D306E30E785}"/>
+              </a:ext>
+            </a:extLst>
+          </p:cNvPr>
+          <p:cNvSpPr>
+            <a:spLocks noGrp="1"/>
+          </p:cNvSpPr>
+          <p:nvPr>
             <p:ph idx="1"/>
           </p:nvPr>
         </p:nvSpPr>
-        <p:spPr>
-          <a:xfrm>
-            <a:off x="836141" y="383059"/>
-            <a:ext cx="10515600" cy="6109816"/>
-          </a:xfrm>
-        </p:spPr>
+        <p:spPr/>
         <p:txBody>
           <a:bodyPr>
             <a:normAutofit/>
@@ -6581,7 +6826,7 @@
           <a:p>
             <a:r>
               <a:rPr lang="en-US"/>
-              <a:t>People match with others of equal attractiveness and have children who inherit </a:t>
+              <a:t>Individuals in a large population have a genetic trait </a:t>
             </a:r>
             <a:r>
               <a:rPr lang="en-US">
@@ -6593,7 +6838,7 @@
             </a:r>
             <a:r>
               <a:rPr lang="en-US"/>
-              <a:t> and </a:t>
+              <a:t> and a social status </a:t>
             </a:r>
             <a:r>
               <a:rPr lang="en-US">
@@ -6605,143 +6850,7 @@
             </a:r>
             <a:r>
               <a:rPr lang="en-US"/>
-              <a:t>:</a:t>
-            </a:r>
-          </a:p>
-          <a:p>
-            <a:pPr algn="ctr"/>
-            <a:r>
-              <a:rPr lang="en-US">
-                <a:solidFill>
-                  <a:schemeClr val="accent1"/>
-                </a:solidFill>
-              </a:rPr>
-              <a:t>g</a:t>
-            </a:r>
-            <a:r>
-              <a:rPr lang="en-US" baseline="-25000">
-                <a:solidFill>
-                  <a:schemeClr val="accent1"/>
-                </a:solidFill>
-              </a:rPr>
-              <a:t>c</a:t>
-            </a:r>
-            <a:r>
-              <a:rPr lang="en-US">
-                <a:solidFill>
-                  <a:schemeClr val="accent1"/>
-                </a:solidFill>
-              </a:rPr>
-              <a:t> = (g</a:t>
-            </a:r>
-            <a:r>
-              <a:rPr lang="en-US" baseline="-25000">
-                <a:solidFill>
-                  <a:schemeClr val="accent1"/>
-                </a:solidFill>
-              </a:rPr>
-              <a:t>d</a:t>
-            </a:r>
-            <a:r>
-              <a:rPr lang="en-US">
-                <a:solidFill>
-                  <a:schemeClr val="accent1"/>
-                </a:solidFill>
-              </a:rPr>
-              <a:t> + g</a:t>
-            </a:r>
-            <a:r>
-              <a:rPr lang="en-US" baseline="-25000">
-                <a:solidFill>
-                  <a:schemeClr val="accent1"/>
-                </a:solidFill>
-              </a:rPr>
-              <a:t>m</a:t>
-            </a:r>
-            <a:r>
-              <a:rPr lang="en-US">
-                <a:solidFill>
-                  <a:schemeClr val="accent1"/>
-                </a:solidFill>
-              </a:rPr>
-              <a:t> )/2</a:t>
-            </a:r>
-          </a:p>
-          <a:p>
-            <a:pPr algn="ctr"/>
-            <a:r>
-              <a:rPr lang="en-US">
-                <a:solidFill>
-                  <a:schemeClr val="accent1"/>
-                </a:solidFill>
-              </a:rPr>
-              <a:t>s</a:t>
-            </a:r>
-            <a:r>
-              <a:rPr lang="en-US" baseline="-25000">
-                <a:solidFill>
-                  <a:schemeClr val="accent1"/>
-                </a:solidFill>
-              </a:rPr>
-              <a:t>c</a:t>
-            </a:r>
-            <a:r>
-              <a:rPr lang="en-US">
-                <a:solidFill>
-                  <a:schemeClr val="accent1"/>
-                </a:solidFill>
-              </a:rPr>
-              <a:t> = (s</a:t>
-            </a:r>
-            <a:r>
-              <a:rPr lang="en-US" baseline="-25000">
-                <a:solidFill>
-                  <a:schemeClr val="accent1"/>
-                </a:solidFill>
-              </a:rPr>
-              <a:t>d</a:t>
-            </a:r>
-            <a:r>
-              <a:rPr lang="en-US">
-                <a:solidFill>
-                  <a:schemeClr val="accent1"/>
-                </a:solidFill>
-              </a:rPr>
-              <a:t> + s</a:t>
-            </a:r>
-            <a:r>
-              <a:rPr lang="en-US" baseline="-25000">
-                <a:solidFill>
-                  <a:schemeClr val="accent1"/>
-                </a:solidFill>
-              </a:rPr>
-              <a:t>m</a:t>
-            </a:r>
-            <a:r>
-              <a:rPr lang="en-US">
-                <a:solidFill>
-                  <a:schemeClr val="accent1"/>
-                </a:solidFill>
-              </a:rPr>
-              <a:t> )/2</a:t>
-            </a:r>
-            <a:br>
-              <a:rPr lang="en-US">
-                <a:solidFill>
-                  <a:schemeClr val="accent1"/>
-                </a:solidFill>
-              </a:rPr>
-            </a:br>
-            <a:endParaRPr lang="en-US">
-              <a:solidFill>
-                <a:schemeClr val="accent1"/>
-              </a:solidFill>
-            </a:endParaRPr>
-          </a:p>
-          <a:p>
-            <a:r>
-              <a:rPr lang="en-US"/>
-              <a:t>Write </a:t>
+              <a:t> drawn from continuous* distributions </a:t>
             </a:r>
             <a:r>
               <a:rPr lang="en-US">
@@ -6752,14 +6861,6 @@
               <a:t>G</a:t>
             </a:r>
             <a:r>
-              <a:rPr lang="en-US" baseline="-25000">
-                <a:solidFill>
-                  <a:schemeClr val="accent1"/>
-                </a:solidFill>
-              </a:rPr>
-              <a:t>p</a:t>
-            </a:r>
-            <a:r>
               <a:rPr lang="en-US"/>
               <a:t>, </a:t>
             </a:r>
@@ -6772,87 +6873,61 @@
               <a:t>S</a:t>
             </a:r>
             <a:r>
-              <a:rPr lang="en-US" baseline="-25000">
-                <a:solidFill>
-                  <a:schemeClr val="accent1"/>
-                </a:solidFill>
-              </a:rPr>
-              <a:t>p</a:t>
-            </a:r>
-            <a:r>
-              <a:rPr lang="en-US"/>
-              <a:t> and </a:t>
-            </a:r>
+              <a:rPr lang="en-US"/>
+              <a:t>. </a:t>
+            </a:r>
+          </a:p>
+          <a:p>
+            <a:r>
+              <a:rPr lang="en-US"/>
+              <a:t>They match according to an attractiveness function</a:t>
+            </a:r>
+          </a:p>
+          <a:p>
+            <a:pPr algn="ctr"/>
             <a:r>
               <a:rPr lang="en-US">
                 <a:solidFill>
                   <a:schemeClr val="accent1"/>
                 </a:solidFill>
               </a:rPr>
-              <a:t>G</a:t>
-            </a:r>
-            <a:r>
-              <a:rPr lang="en-US" baseline="-25000">
-                <a:solidFill>
-                  <a:schemeClr val="accent1"/>
-                </a:solidFill>
-              </a:rPr>
-              <a:t>c</a:t>
-            </a:r>
-            <a:r>
-              <a:rPr lang="en-US"/>
-              <a:t>, </a:t>
-            </a:r>
+              <a:t>A(g, s) = f((1-k)g, ks)</a:t>
+            </a:r>
+          </a:p>
+          <a:p>
+            <a:endParaRPr lang="en-US"/>
+          </a:p>
+          <a:p>
             <a:r>
               <a:rPr lang="en-US">
                 <a:solidFill>
                   <a:schemeClr val="accent1"/>
                 </a:solidFill>
               </a:rPr>
-              <a:t>S</a:t>
-            </a:r>
-            <a:r>
-              <a:rPr lang="en-US" baseline="-25000">
-                <a:solidFill>
-                  <a:schemeClr val="accent1"/>
-                </a:solidFill>
-              </a:rPr>
-              <a:t>c</a:t>
-            </a:r>
-            <a:r>
-              <a:rPr lang="en-US"/>
-              <a:t> for the distribution in the parents and children’s generation respectively.</a:t>
-            </a:r>
-          </a:p>
-          <a:p>
-            <a:endParaRPr lang="en-US"/>
-          </a:p>
-          <a:p>
-            <a:r>
-              <a:rPr lang="en-US" b="1"/>
-              <a:t>Proposition</a:t>
-            </a:r>
-          </a:p>
-          <a:p>
-            <a:r>
-              <a:rPr lang="en-US"/>
-              <a:t>i) </a:t>
-            </a:r>
+              <a:t>f</a:t>
+            </a:r>
+            <a:r>
+              <a:rPr lang="en-US"/>
+              <a:t> is increasing in its arguments</a:t>
+            </a:r>
+            <a:endParaRPr lang="en-US">
+              <a:solidFill>
+                <a:schemeClr val="accent1"/>
+              </a:solidFill>
+            </a:endParaRPr>
+          </a:p>
+          <a:p>
             <a:r>
               <a:rPr lang="en-US">
                 <a:solidFill>
                   <a:schemeClr val="accent1"/>
                 </a:solidFill>
               </a:rPr>
-              <a:t>Cov(G</a:t>
-            </a:r>
-            <a:r>
-              <a:rPr lang="en-US" baseline="-25000">
-                <a:solidFill>
-                  <a:schemeClr val="accent1"/>
-                </a:solidFill>
-              </a:rPr>
-              <a:t>c</a:t>
+              <a:t>k</a:t>
+            </a:r>
+            <a:r>
+              <a:rPr lang="en-US"/>
+              <a:t> describes the society’s marriage market. If </a:t>
             </a:r>
             <a:r>
               <a:rPr lang="en-US">
@@ -6860,15 +6935,11 @@
                   <a:schemeClr val="accent1"/>
                 </a:solidFill>
               </a:rPr>
-              <a:t>, S</a:t>
-            </a:r>
-            <a:r>
-              <a:rPr lang="en-US" baseline="-25000">
-                <a:solidFill>
-                  <a:schemeClr val="accent1"/>
-                </a:solidFill>
-              </a:rPr>
-              <a:t>c</a:t>
+              <a:t>k = 0</a:t>
+            </a:r>
+            <a:r>
+              <a:rPr lang="en-US"/>
+              <a:t>, only genetics matter. If </a:t>
             </a:r>
             <a:r>
               <a:rPr lang="en-US">
@@ -6876,43 +6947,11 @@
                   <a:schemeClr val="accent1"/>
                 </a:solidFill>
               </a:rPr>
-              <a:t>) ≥ Cov(G</a:t>
-            </a:r>
-            <a:r>
-              <a:rPr lang="en-US" baseline="-25000">
-                <a:solidFill>
-                  <a:schemeClr val="accent1"/>
-                </a:solidFill>
-              </a:rPr>
-              <a:t>p</a:t>
-            </a:r>
-            <a:r>
-              <a:rPr lang="en-US">
-                <a:solidFill>
-                  <a:schemeClr val="accent1"/>
-                </a:solidFill>
-              </a:rPr>
-              <a:t>, S</a:t>
-            </a:r>
-            <a:r>
-              <a:rPr lang="en-US" baseline="-25000">
-                <a:solidFill>
-                  <a:schemeClr val="accent1"/>
-                </a:solidFill>
-              </a:rPr>
-              <a:t>p</a:t>
-            </a:r>
-            <a:r>
-              <a:rPr lang="en-US">
-                <a:solidFill>
-                  <a:schemeClr val="accent1"/>
-                </a:solidFill>
-              </a:rPr>
-              <a:t>)</a:t>
-            </a:r>
-            <a:r>
-              <a:rPr lang="en-US"/>
-              <a:t> with strict inequality iff </a:t>
+              <a:t>k = 1</a:t>
+            </a:r>
+            <a:r>
+              <a:rPr lang="en-US"/>
+              <a:t>, only social status matters. For realistic societies, </a:t>
             </a:r>
             <a:r>
               <a:rPr lang="en-US">
@@ -6930,194 +6969,15 @@
           <a:p>
             <a:r>
               <a:rPr lang="en-US"/>
-              <a:t>ii) If </a:t>
-            </a:r>
-            <a:r>
-              <a:rPr lang="en-US">
-                <a:solidFill>
-                  <a:schemeClr val="accent1"/>
-                </a:solidFill>
-              </a:rPr>
-              <a:t>corr(G</a:t>
-            </a:r>
-            <a:r>
-              <a:rPr lang="en-US" baseline="-25000">
-                <a:solidFill>
-                  <a:schemeClr val="accent1"/>
-                </a:solidFill>
-              </a:rPr>
-              <a:t>p</a:t>
-            </a:r>
-            <a:r>
-              <a:rPr lang="en-US">
-                <a:solidFill>
-                  <a:schemeClr val="accent1"/>
-                </a:solidFill>
-              </a:rPr>
-              <a:t>, S</a:t>
-            </a:r>
-            <a:r>
-              <a:rPr lang="en-US" baseline="-25000">
-                <a:solidFill>
-                  <a:schemeClr val="accent1"/>
-                </a:solidFill>
-              </a:rPr>
-              <a:t>p</a:t>
-            </a:r>
-            <a:r>
-              <a:rPr lang="en-US">
-                <a:solidFill>
-                  <a:schemeClr val="accent1"/>
-                </a:solidFill>
-              </a:rPr>
-              <a:t>) ≥ 0</a:t>
-            </a:r>
-            <a:r>
-              <a:rPr lang="en-US"/>
-              <a:t>, then </a:t>
-            </a:r>
-            <a:r>
-              <a:rPr lang="en-US">
-                <a:solidFill>
-                  <a:schemeClr val="accent1"/>
-                </a:solidFill>
-              </a:rPr>
-              <a:t>corr(G</a:t>
-            </a:r>
-            <a:r>
-              <a:rPr lang="en-US" baseline="-25000">
-                <a:solidFill>
-                  <a:schemeClr val="accent1"/>
-                </a:solidFill>
-              </a:rPr>
-              <a:t>c</a:t>
-            </a:r>
-            <a:r>
-              <a:rPr lang="en-US">
-                <a:solidFill>
-                  <a:schemeClr val="accent1"/>
-                </a:solidFill>
-              </a:rPr>
-              <a:t>, S</a:t>
-            </a:r>
-            <a:r>
-              <a:rPr lang="en-US" baseline="-25000">
-                <a:solidFill>
-                  <a:schemeClr val="accent1"/>
-                </a:solidFill>
-              </a:rPr>
-              <a:t>c</a:t>
-            </a:r>
-            <a:r>
-              <a:rPr lang="en-US">
-                <a:solidFill>
-                  <a:schemeClr val="accent1"/>
-                </a:solidFill>
-              </a:rPr>
-              <a:t>) ≥ corr(G</a:t>
-            </a:r>
-            <a:r>
-              <a:rPr lang="en-US" baseline="-25000">
-                <a:solidFill>
-                  <a:schemeClr val="accent1"/>
-                </a:solidFill>
-              </a:rPr>
-              <a:t>p</a:t>
-            </a:r>
-            <a:r>
-              <a:rPr lang="en-US">
-                <a:solidFill>
-                  <a:schemeClr val="accent1"/>
-                </a:solidFill>
-              </a:rPr>
-              <a:t>, S</a:t>
-            </a:r>
-            <a:r>
-              <a:rPr lang="en-US" baseline="-25000">
-                <a:solidFill>
-                  <a:schemeClr val="accent1"/>
-                </a:solidFill>
-              </a:rPr>
-              <a:t>p</a:t>
-            </a:r>
-            <a:r>
-              <a:rPr lang="en-US">
-                <a:solidFill>
-                  <a:schemeClr val="accent1"/>
-                </a:solidFill>
-              </a:rPr>
-              <a:t>)</a:t>
-            </a:r>
-            <a:r>
-              <a:rPr lang="en-US"/>
-              <a:t>, with strict inequality iff either </a:t>
-            </a:r>
-            <a:r>
-              <a:rPr lang="en-US">
-                <a:solidFill>
-                  <a:schemeClr val="accent1"/>
-                </a:solidFill>
-              </a:rPr>
-              <a:t>0 &lt; k &lt; 1</a:t>
-            </a:r>
-            <a:r>
-              <a:rPr lang="en-US"/>
-              <a:t> or </a:t>
-            </a:r>
-            <a:r>
-              <a:rPr lang="en-US">
-                <a:solidFill>
-                  <a:schemeClr val="accent1"/>
-                </a:solidFill>
-              </a:rPr>
-              <a:t>corr(G</a:t>
-            </a:r>
-            <a:r>
-              <a:rPr lang="en-US" baseline="-25000">
-                <a:solidFill>
-                  <a:schemeClr val="accent1"/>
-                </a:solidFill>
-              </a:rPr>
-              <a:t>p</a:t>
-            </a:r>
-            <a:r>
-              <a:rPr lang="en-US">
-                <a:solidFill>
-                  <a:schemeClr val="accent1"/>
-                </a:solidFill>
-              </a:rPr>
-              <a:t>, S</a:t>
-            </a:r>
-            <a:r>
-              <a:rPr lang="en-US" baseline="-25000">
-                <a:solidFill>
-                  <a:schemeClr val="accent1"/>
-                </a:solidFill>
-              </a:rPr>
-              <a:t>p</a:t>
-            </a:r>
-            <a:r>
-              <a:rPr lang="en-US">
-                <a:solidFill>
-                  <a:schemeClr val="accent1"/>
-                </a:solidFill>
-              </a:rPr>
-              <a:t>) &gt; 0</a:t>
-            </a:r>
-            <a:r>
-              <a:rPr lang="en-US"/>
-              <a:t>. </a:t>
-            </a:r>
-          </a:p>
-          <a:p>
-            <a:endParaRPr lang="en-US"/>
+              <a:t>  </a:t>
+            </a:r>
           </a:p>
         </p:txBody>
       </p:sp>
     </p:spTree>
     <p:extLst>
       <p:ext uri="{BB962C8B-B14F-4D97-AF65-F5344CB8AC3E}">
-        <p14:creationId xmlns:p14="http://schemas.microsoft.com/office/powerpoint/2010/main" val="757103127"/>
+        <p14:creationId xmlns:p14="http://schemas.microsoft.com/office/powerpoint/2010/main" val="4002184248"/>
       </p:ext>
     </p:extLst>
   </p:cSld>
@@ -7146,10 +7006,10 @@
       </p:grpSpPr>
       <p:sp>
         <p:nvSpPr>
-          <p:cNvPr id="2" name="Title 1">
+          <p:cNvPr id="3" name="Content Placeholder 2">
             <a:extLst>
               <a:ext uri="{FF2B5EF4-FFF2-40B4-BE49-F238E27FC236}">
-                <a16:creationId xmlns:a16="http://schemas.microsoft.com/office/drawing/2014/main" id="{22CC0DA0-1E5A-B846-9F62-9D183C1BCC0A}"/>
+                <a16:creationId xmlns:a16="http://schemas.microsoft.com/office/drawing/2014/main" id="{780E3212-209C-6444-880F-EEFC66F4C19B}"/>
               </a:ext>
             </a:extLst>
           </p:cNvPr>
@@ -7157,77 +7017,560 @@
             <a:spLocks noGrp="1"/>
           </p:cNvSpPr>
           <p:nvPr>
-            <p:ph type="title"/>
-          </p:nvPr>
-        </p:nvSpPr>
-        <p:spPr/>
-        <p:txBody>
-          <a:bodyPr/>
-          <a:lstStyle/>
-          <a:p>
-            <a:endParaRPr lang="en-US"/>
-          </a:p>
-        </p:txBody>
-      </p:sp>
-      <p:sp>
-        <p:nvSpPr>
-          <p:cNvPr id="3" name="Content Placeholder 2">
-            <a:extLst>
-              <a:ext uri="{FF2B5EF4-FFF2-40B4-BE49-F238E27FC236}">
-                <a16:creationId xmlns:a16="http://schemas.microsoft.com/office/drawing/2014/main" id="{AE904DC8-8796-0E41-A422-902A27A2E3E1}"/>
-              </a:ext>
-            </a:extLst>
-          </p:cNvPr>
-          <p:cNvSpPr>
-            <a:spLocks noGrp="1"/>
-          </p:cNvSpPr>
-          <p:nvPr>
             <p:ph idx="1"/>
           </p:nvPr>
         </p:nvSpPr>
-        <p:spPr/>
-        <p:txBody>
-          <a:bodyPr/>
-          <a:lstStyle/>
-          <a:p>
-            <a:endParaRPr lang="en-US"/>
-          </a:p>
-        </p:txBody>
-      </p:sp>
-      <p:pic>
-        <p:nvPicPr>
-          <p:cNvPr id="6" name="Picture 5">
-            <a:extLst>
-              <a:ext uri="{FF2B5EF4-FFF2-40B4-BE49-F238E27FC236}">
-                <a16:creationId xmlns:a16="http://schemas.microsoft.com/office/drawing/2014/main" id="{E420142D-970F-C24C-BF49-7332BE0B1BD8}"/>
-              </a:ext>
-            </a:extLst>
-          </p:cNvPr>
-          <p:cNvPicPr>
-            <a:picLocks noChangeAspect="1"/>
-          </p:cNvPicPr>
-          <p:nvPr/>
-        </p:nvPicPr>
-        <p:blipFill>
-          <a:blip r:embed="rId2"/>
-          <a:stretch>
-            <a:fillRect/>
-          </a:stretch>
-        </p:blipFill>
         <p:spPr>
           <a:xfrm>
-            <a:off x="1727200" y="1365250"/>
-            <a:ext cx="8737600" cy="4127500"/>
+            <a:off x="836141" y="383059"/>
+            <a:ext cx="10515600" cy="6109816"/>
           </a:xfrm>
-          <a:prstGeom prst="rect">
-            <a:avLst/>
-          </a:prstGeom>
         </p:spPr>
-      </p:pic>
+        <p:txBody>
+          <a:bodyPr>
+            <a:normAutofit/>
+          </a:bodyPr>
+          <a:lstStyle/>
+          <a:p>
+            <a:r>
+              <a:rPr lang="en-US"/>
+              <a:t>People match with others of equal attractiveness and have children who inherit </a:t>
+            </a:r>
+            <a:r>
+              <a:rPr lang="en-US">
+                <a:solidFill>
+                  <a:schemeClr val="accent1"/>
+                </a:solidFill>
+              </a:rPr>
+              <a:t>g</a:t>
+            </a:r>
+            <a:r>
+              <a:rPr lang="en-US"/>
+              <a:t> and </a:t>
+            </a:r>
+            <a:r>
+              <a:rPr lang="en-US">
+                <a:solidFill>
+                  <a:schemeClr val="accent1"/>
+                </a:solidFill>
+              </a:rPr>
+              <a:t>s</a:t>
+            </a:r>
+            <a:r>
+              <a:rPr lang="en-US"/>
+              <a:t>:</a:t>
+            </a:r>
+          </a:p>
+          <a:p>
+            <a:pPr algn="ctr"/>
+            <a:r>
+              <a:rPr lang="en-US">
+                <a:solidFill>
+                  <a:schemeClr val="accent1"/>
+                </a:solidFill>
+              </a:rPr>
+              <a:t>g</a:t>
+            </a:r>
+            <a:r>
+              <a:rPr lang="en-US" baseline="-25000">
+                <a:solidFill>
+                  <a:schemeClr val="accent1"/>
+                </a:solidFill>
+              </a:rPr>
+              <a:t>c</a:t>
+            </a:r>
+            <a:r>
+              <a:rPr lang="en-US">
+                <a:solidFill>
+                  <a:schemeClr val="accent1"/>
+                </a:solidFill>
+              </a:rPr>
+              <a:t> = (g</a:t>
+            </a:r>
+            <a:r>
+              <a:rPr lang="en-US" baseline="-25000">
+                <a:solidFill>
+                  <a:schemeClr val="accent1"/>
+                </a:solidFill>
+              </a:rPr>
+              <a:t>d</a:t>
+            </a:r>
+            <a:r>
+              <a:rPr lang="en-US">
+                <a:solidFill>
+                  <a:schemeClr val="accent1"/>
+                </a:solidFill>
+              </a:rPr>
+              <a:t> + g</a:t>
+            </a:r>
+            <a:r>
+              <a:rPr lang="en-US" baseline="-25000">
+                <a:solidFill>
+                  <a:schemeClr val="accent1"/>
+                </a:solidFill>
+              </a:rPr>
+              <a:t>m</a:t>
+            </a:r>
+            <a:r>
+              <a:rPr lang="en-US">
+                <a:solidFill>
+                  <a:schemeClr val="accent1"/>
+                </a:solidFill>
+              </a:rPr>
+              <a:t> )/2</a:t>
+            </a:r>
+          </a:p>
+          <a:p>
+            <a:pPr algn="ctr"/>
+            <a:r>
+              <a:rPr lang="en-US">
+                <a:solidFill>
+                  <a:schemeClr val="accent1"/>
+                </a:solidFill>
+              </a:rPr>
+              <a:t>s</a:t>
+            </a:r>
+            <a:r>
+              <a:rPr lang="en-US" baseline="-25000">
+                <a:solidFill>
+                  <a:schemeClr val="accent1"/>
+                </a:solidFill>
+              </a:rPr>
+              <a:t>c</a:t>
+            </a:r>
+            <a:r>
+              <a:rPr lang="en-US">
+                <a:solidFill>
+                  <a:schemeClr val="accent1"/>
+                </a:solidFill>
+              </a:rPr>
+              <a:t> = (s</a:t>
+            </a:r>
+            <a:r>
+              <a:rPr lang="en-US" baseline="-25000">
+                <a:solidFill>
+                  <a:schemeClr val="accent1"/>
+                </a:solidFill>
+              </a:rPr>
+              <a:t>d</a:t>
+            </a:r>
+            <a:r>
+              <a:rPr lang="en-US">
+                <a:solidFill>
+                  <a:schemeClr val="accent1"/>
+                </a:solidFill>
+              </a:rPr>
+              <a:t> + s</a:t>
+            </a:r>
+            <a:r>
+              <a:rPr lang="en-US" baseline="-25000">
+                <a:solidFill>
+                  <a:schemeClr val="accent1"/>
+                </a:solidFill>
+              </a:rPr>
+              <a:t>m</a:t>
+            </a:r>
+            <a:r>
+              <a:rPr lang="en-US">
+                <a:solidFill>
+                  <a:schemeClr val="accent1"/>
+                </a:solidFill>
+              </a:rPr>
+              <a:t> )/2</a:t>
+            </a:r>
+            <a:br>
+              <a:rPr lang="en-US">
+                <a:solidFill>
+                  <a:schemeClr val="accent1"/>
+                </a:solidFill>
+              </a:rPr>
+            </a:br>
+            <a:endParaRPr lang="en-US">
+              <a:solidFill>
+                <a:schemeClr val="accent1"/>
+              </a:solidFill>
+            </a:endParaRPr>
+          </a:p>
+          <a:p>
+            <a:r>
+              <a:rPr lang="en-US"/>
+              <a:t>Write </a:t>
+            </a:r>
+            <a:r>
+              <a:rPr lang="en-US">
+                <a:solidFill>
+                  <a:schemeClr val="accent1"/>
+                </a:solidFill>
+              </a:rPr>
+              <a:t>G</a:t>
+            </a:r>
+            <a:r>
+              <a:rPr lang="en-US" baseline="-25000">
+                <a:solidFill>
+                  <a:schemeClr val="accent1"/>
+                </a:solidFill>
+              </a:rPr>
+              <a:t>p</a:t>
+            </a:r>
+            <a:r>
+              <a:rPr lang="en-US"/>
+              <a:t>, </a:t>
+            </a:r>
+            <a:r>
+              <a:rPr lang="en-US">
+                <a:solidFill>
+                  <a:schemeClr val="accent1"/>
+                </a:solidFill>
+              </a:rPr>
+              <a:t>S</a:t>
+            </a:r>
+            <a:r>
+              <a:rPr lang="en-US" baseline="-25000">
+                <a:solidFill>
+                  <a:schemeClr val="accent1"/>
+                </a:solidFill>
+              </a:rPr>
+              <a:t>p</a:t>
+            </a:r>
+            <a:r>
+              <a:rPr lang="en-US"/>
+              <a:t> and </a:t>
+            </a:r>
+            <a:r>
+              <a:rPr lang="en-US">
+                <a:solidFill>
+                  <a:schemeClr val="accent1"/>
+                </a:solidFill>
+              </a:rPr>
+              <a:t>G</a:t>
+            </a:r>
+            <a:r>
+              <a:rPr lang="en-US" baseline="-25000">
+                <a:solidFill>
+                  <a:schemeClr val="accent1"/>
+                </a:solidFill>
+              </a:rPr>
+              <a:t>c</a:t>
+            </a:r>
+            <a:r>
+              <a:rPr lang="en-US"/>
+              <a:t>, </a:t>
+            </a:r>
+            <a:r>
+              <a:rPr lang="en-US">
+                <a:solidFill>
+                  <a:schemeClr val="accent1"/>
+                </a:solidFill>
+              </a:rPr>
+              <a:t>S</a:t>
+            </a:r>
+            <a:r>
+              <a:rPr lang="en-US" baseline="-25000">
+                <a:solidFill>
+                  <a:schemeClr val="accent1"/>
+                </a:solidFill>
+              </a:rPr>
+              <a:t>c</a:t>
+            </a:r>
+            <a:r>
+              <a:rPr lang="en-US"/>
+              <a:t> for the distribution in the parents and children’s generation respectively.</a:t>
+            </a:r>
+          </a:p>
+          <a:p>
+            <a:endParaRPr lang="en-US"/>
+          </a:p>
+          <a:p>
+            <a:r>
+              <a:rPr lang="en-US" b="1"/>
+              <a:t>Proposition</a:t>
+            </a:r>
+          </a:p>
+          <a:p>
+            <a:r>
+              <a:rPr lang="en-US"/>
+              <a:t>i) </a:t>
+            </a:r>
+            <a:r>
+              <a:rPr lang="en-US">
+                <a:solidFill>
+                  <a:schemeClr val="accent1"/>
+                </a:solidFill>
+              </a:rPr>
+              <a:t>Cov(G</a:t>
+            </a:r>
+            <a:r>
+              <a:rPr lang="en-US" baseline="-25000">
+                <a:solidFill>
+                  <a:schemeClr val="accent1"/>
+                </a:solidFill>
+              </a:rPr>
+              <a:t>c</a:t>
+            </a:r>
+            <a:r>
+              <a:rPr lang="en-US">
+                <a:solidFill>
+                  <a:schemeClr val="accent1"/>
+                </a:solidFill>
+              </a:rPr>
+              <a:t>, S</a:t>
+            </a:r>
+            <a:r>
+              <a:rPr lang="en-US" baseline="-25000">
+                <a:solidFill>
+                  <a:schemeClr val="accent1"/>
+                </a:solidFill>
+              </a:rPr>
+              <a:t>c</a:t>
+            </a:r>
+            <a:r>
+              <a:rPr lang="en-US">
+                <a:solidFill>
+                  <a:schemeClr val="accent1"/>
+                </a:solidFill>
+              </a:rPr>
+              <a:t>) ≥ Cov(G</a:t>
+            </a:r>
+            <a:r>
+              <a:rPr lang="en-US" baseline="-25000">
+                <a:solidFill>
+                  <a:schemeClr val="accent1"/>
+                </a:solidFill>
+              </a:rPr>
+              <a:t>p</a:t>
+            </a:r>
+            <a:r>
+              <a:rPr lang="en-US">
+                <a:solidFill>
+                  <a:schemeClr val="accent1"/>
+                </a:solidFill>
+              </a:rPr>
+              <a:t>, S</a:t>
+            </a:r>
+            <a:r>
+              <a:rPr lang="en-US" baseline="-25000">
+                <a:solidFill>
+                  <a:schemeClr val="accent1"/>
+                </a:solidFill>
+              </a:rPr>
+              <a:t>p</a:t>
+            </a:r>
+            <a:r>
+              <a:rPr lang="en-US">
+                <a:solidFill>
+                  <a:schemeClr val="accent1"/>
+                </a:solidFill>
+              </a:rPr>
+              <a:t>)</a:t>
+            </a:r>
+            <a:r>
+              <a:rPr lang="en-US"/>
+              <a:t> with strict inequality iff </a:t>
+            </a:r>
+            <a:r>
+              <a:rPr lang="en-US">
+                <a:solidFill>
+                  <a:schemeClr val="accent1"/>
+                </a:solidFill>
+              </a:rPr>
+              <a:t>0 &lt; k &lt; 1</a:t>
+            </a:r>
+            <a:r>
+              <a:rPr lang="en-US"/>
+              <a:t>.</a:t>
+            </a:r>
+          </a:p>
+          <a:p>
+            <a:r>
+              <a:rPr lang="en-US"/>
+              <a:t>ii) If </a:t>
+            </a:r>
+            <a:r>
+              <a:rPr lang="en-US">
+                <a:solidFill>
+                  <a:schemeClr val="accent1"/>
+                </a:solidFill>
+              </a:rPr>
+              <a:t>corr(G</a:t>
+            </a:r>
+            <a:r>
+              <a:rPr lang="en-US" baseline="-25000">
+                <a:solidFill>
+                  <a:schemeClr val="accent1"/>
+                </a:solidFill>
+              </a:rPr>
+              <a:t>p</a:t>
+            </a:r>
+            <a:r>
+              <a:rPr lang="en-US">
+                <a:solidFill>
+                  <a:schemeClr val="accent1"/>
+                </a:solidFill>
+              </a:rPr>
+              <a:t>, S</a:t>
+            </a:r>
+            <a:r>
+              <a:rPr lang="en-US" baseline="-25000">
+                <a:solidFill>
+                  <a:schemeClr val="accent1"/>
+                </a:solidFill>
+              </a:rPr>
+              <a:t>p</a:t>
+            </a:r>
+            <a:r>
+              <a:rPr lang="en-US">
+                <a:solidFill>
+                  <a:schemeClr val="accent1"/>
+                </a:solidFill>
+              </a:rPr>
+              <a:t>) ≥ 0</a:t>
+            </a:r>
+            <a:r>
+              <a:rPr lang="en-US"/>
+              <a:t>, then </a:t>
+            </a:r>
+            <a:r>
+              <a:rPr lang="en-US">
+                <a:solidFill>
+                  <a:schemeClr val="accent1"/>
+                </a:solidFill>
+              </a:rPr>
+              <a:t>corr(G</a:t>
+            </a:r>
+            <a:r>
+              <a:rPr lang="en-US" baseline="-25000">
+                <a:solidFill>
+                  <a:schemeClr val="accent1"/>
+                </a:solidFill>
+              </a:rPr>
+              <a:t>c</a:t>
+            </a:r>
+            <a:r>
+              <a:rPr lang="en-US">
+                <a:solidFill>
+                  <a:schemeClr val="accent1"/>
+                </a:solidFill>
+              </a:rPr>
+              <a:t>, S</a:t>
+            </a:r>
+            <a:r>
+              <a:rPr lang="en-US" baseline="-25000">
+                <a:solidFill>
+                  <a:schemeClr val="accent1"/>
+                </a:solidFill>
+              </a:rPr>
+              <a:t>c</a:t>
+            </a:r>
+            <a:r>
+              <a:rPr lang="en-US">
+                <a:solidFill>
+                  <a:schemeClr val="accent1"/>
+                </a:solidFill>
+              </a:rPr>
+              <a:t>) ≥ corr(G</a:t>
+            </a:r>
+            <a:r>
+              <a:rPr lang="en-US" baseline="-25000">
+                <a:solidFill>
+                  <a:schemeClr val="accent1"/>
+                </a:solidFill>
+              </a:rPr>
+              <a:t>p</a:t>
+            </a:r>
+            <a:r>
+              <a:rPr lang="en-US">
+                <a:solidFill>
+                  <a:schemeClr val="accent1"/>
+                </a:solidFill>
+              </a:rPr>
+              <a:t>, S</a:t>
+            </a:r>
+            <a:r>
+              <a:rPr lang="en-US" baseline="-25000">
+                <a:solidFill>
+                  <a:schemeClr val="accent1"/>
+                </a:solidFill>
+              </a:rPr>
+              <a:t>p</a:t>
+            </a:r>
+            <a:r>
+              <a:rPr lang="en-US">
+                <a:solidFill>
+                  <a:schemeClr val="accent1"/>
+                </a:solidFill>
+              </a:rPr>
+              <a:t>)</a:t>
+            </a:r>
+            <a:r>
+              <a:rPr lang="en-US"/>
+              <a:t>, with strict inequality iff either </a:t>
+            </a:r>
+            <a:r>
+              <a:rPr lang="en-US">
+                <a:solidFill>
+                  <a:schemeClr val="accent1"/>
+                </a:solidFill>
+              </a:rPr>
+              <a:t>0 &lt; k &lt; 1</a:t>
+            </a:r>
+            <a:r>
+              <a:rPr lang="en-US"/>
+              <a:t> or </a:t>
+            </a:r>
+            <a:r>
+              <a:rPr lang="en-US">
+                <a:solidFill>
+                  <a:schemeClr val="accent1"/>
+                </a:solidFill>
+              </a:rPr>
+              <a:t>corr(G</a:t>
+            </a:r>
+            <a:r>
+              <a:rPr lang="en-US" baseline="-25000">
+                <a:solidFill>
+                  <a:schemeClr val="accent1"/>
+                </a:solidFill>
+              </a:rPr>
+              <a:t>p</a:t>
+            </a:r>
+            <a:r>
+              <a:rPr lang="en-US">
+                <a:solidFill>
+                  <a:schemeClr val="accent1"/>
+                </a:solidFill>
+              </a:rPr>
+              <a:t>, S</a:t>
+            </a:r>
+            <a:r>
+              <a:rPr lang="en-US" baseline="-25000">
+                <a:solidFill>
+                  <a:schemeClr val="accent1"/>
+                </a:solidFill>
+              </a:rPr>
+              <a:t>p</a:t>
+            </a:r>
+            <a:r>
+              <a:rPr lang="en-US">
+                <a:solidFill>
+                  <a:schemeClr val="accent1"/>
+                </a:solidFill>
+              </a:rPr>
+              <a:t>) &gt; 0</a:t>
+            </a:r>
+            <a:r>
+              <a:rPr lang="en-US"/>
+              <a:t>. </a:t>
+            </a:r>
+          </a:p>
+          <a:p>
+            <a:endParaRPr lang="en-US"/>
+          </a:p>
+        </p:txBody>
+      </p:sp>
     </p:spTree>
     <p:extLst>
       <p:ext uri="{BB962C8B-B14F-4D97-AF65-F5344CB8AC3E}">
-        <p14:creationId xmlns:p14="http://schemas.microsoft.com/office/powerpoint/2010/main" val="2203621143"/>
+        <p14:creationId xmlns:p14="http://schemas.microsoft.com/office/powerpoint/2010/main" val="757103127"/>
       </p:ext>
     </p:extLst>
   </p:cSld>

</xml_diff>